<commit_message>
Project Introduction for Presentation
</commit_message>
<xml_diff>
--- a/Report/Presentation/Simulating Liquid Crystals.pptx
+++ b/Report/Presentation/Simulating Liquid Crystals.pptx
@@ -5,16 +5,20 @@
     <p:sldMasterId id="2147483660" r:id="rId1"/>
   </p:sldMasterIdLst>
   <p:notesMasterIdLst>
-    <p:notesMasterId r:id="rId9"/>
+    <p:notesMasterId r:id="rId13"/>
   </p:notesMasterIdLst>
   <p:sldIdLst>
     <p:sldId id="256" r:id="rId2"/>
     <p:sldId id="257" r:id="rId3"/>
     <p:sldId id="262" r:id="rId4"/>
-    <p:sldId id="258" r:id="rId5"/>
-    <p:sldId id="259" r:id="rId6"/>
-    <p:sldId id="260" r:id="rId7"/>
-    <p:sldId id="261" r:id="rId8"/>
+    <p:sldId id="264" r:id="rId5"/>
+    <p:sldId id="265" r:id="rId6"/>
+    <p:sldId id="266" r:id="rId7"/>
+    <p:sldId id="258" r:id="rId8"/>
+    <p:sldId id="259" r:id="rId9"/>
+    <p:sldId id="260" r:id="rId10"/>
+    <p:sldId id="261" r:id="rId11"/>
+    <p:sldId id="263" r:id="rId12"/>
   </p:sldIdLst>
   <p:sldSz cx="12192000" cy="6858000"/>
   <p:notesSz cx="6858000" cy="9144000"/>
@@ -113,6 +117,11 @@
       </a:defRPr>
     </a:lvl9pPr>
   </p:defaultTextStyle>
+  <p:extLst>
+    <p:ext uri="{EFAFB233-063F-42B5-8137-9DF3F51BA10A}">
+      <p15:sldGuideLst xmlns:p15="http://schemas.microsoft.com/office/powerpoint/2012/main"/>
+    </p:ext>
+  </p:extLst>
 </p:presentation>
 </file>
 
@@ -1352,48 +1361,67 @@
             <a:spLocks noGrp="1"/>
           </p:cNvSpPr>
           <p:nvPr>
-            <p:ph idx="1"/>
-          </p:nvPr>
-        </p:nvSpPr>
-        <p:spPr/>
-        <p:txBody>
-          <a:bodyPr/>
-          <a:lstStyle/>
+            <p:ph idx="1" hasCustomPrompt="1"/>
+          </p:nvPr>
+        </p:nvSpPr>
+        <p:spPr/>
+        <p:txBody>
+          <a:bodyPr>
+            <a:normAutofit/>
+          </a:bodyPr>
+          <a:lstStyle>
+            <a:lvl1pPr marL="91440" indent="-91440">
+              <a:buFont typeface="Arial" panose="020B0604020202020204" pitchFamily="34" charset="0"/>
+              <a:buChar char="•"/>
+              <a:defRPr sz="2800"/>
+            </a:lvl1pPr>
+            <a:lvl2pPr>
+              <a:defRPr sz="2400"/>
+            </a:lvl2pPr>
+            <a:lvl3pPr>
+              <a:defRPr sz="1800"/>
+            </a:lvl3pPr>
+            <a:lvl4pPr>
+              <a:defRPr sz="1800"/>
+            </a:lvl4pPr>
+            <a:lvl5pPr>
+              <a:defRPr sz="1800"/>
+            </a:lvl5pPr>
+          </a:lstStyle>
           <a:p>
             <a:pPr lvl="0"/>
             <a:r>
-              <a:rPr lang="en-US"/>
-              <a:t>Click to edit Master text styles</a:t>
+              <a:rPr lang="en-US" dirty="0"/>
+              <a:t> Click to edit Master text styles</a:t>
             </a:r>
           </a:p>
           <a:p>
             <a:pPr lvl="1"/>
             <a:r>
-              <a:rPr lang="en-US"/>
+              <a:rPr lang="en-US" dirty="0"/>
               <a:t>Second level</a:t>
             </a:r>
           </a:p>
           <a:p>
             <a:pPr lvl="2"/>
             <a:r>
-              <a:rPr lang="en-US"/>
+              <a:rPr lang="en-US" dirty="0"/>
               <a:t>Third level</a:t>
             </a:r>
           </a:p>
           <a:p>
             <a:pPr lvl="3"/>
             <a:r>
-              <a:rPr lang="en-US"/>
+              <a:rPr lang="en-US" dirty="0"/>
               <a:t>Fourth level</a:t>
             </a:r>
           </a:p>
           <a:p>
             <a:pPr lvl="4"/>
             <a:r>
-              <a:rPr lang="en-US"/>
+              <a:rPr lang="en-US" dirty="0"/>
               <a:t>Fifth level</a:t>
             </a:r>
-            <a:endParaRPr lang="en-US" dirty="0"/>
           </a:p>
         </p:txBody>
       </p:sp>
@@ -2788,7 +2816,7 @@
 </file>
 
 <file path=ppt/slideLayouts/slideLayout8.xml><?xml version="1.0" encoding="utf-8"?>
-<p:sldLayout xmlns:a="http://schemas.openxmlformats.org/drawingml/2006/main" xmlns:r="http://schemas.openxmlformats.org/officeDocument/2006/relationships" xmlns:p="http://schemas.openxmlformats.org/presentationml/2006/main" showMasterSp="0" type="objTx" preserve="1">
+<p:sldLayout xmlns:a="http://schemas.openxmlformats.org/drawingml/2006/main" xmlns:r="http://schemas.openxmlformats.org/officeDocument/2006/relationships" xmlns:p="http://schemas.openxmlformats.org/presentationml/2006/main" showMasterSp="0" preserve="1" userDrawn="1">
   <p:cSld name="Content with Caption">
     <p:spTree>
       <p:nvGrpSpPr>
@@ -2931,7 +2959,7 @@
         <p:spPr>
           <a:xfrm>
             <a:off x="4800600" y="731520"/>
-            <a:ext cx="6492240" cy="5257800"/>
+            <a:ext cx="6492240" cy="4355385"/>
           </a:xfrm>
         </p:spPr>
         <p:txBody>
@@ -2987,8 +3015,8 @@
         </p:nvSpPr>
         <p:spPr>
           <a:xfrm>
-            <a:off x="457200" y="2926080"/>
-            <a:ext cx="3200400" cy="3379124"/>
+            <a:off x="457200" y="4998128"/>
+            <a:ext cx="3200400" cy="1307076"/>
           </a:xfrm>
         </p:spPr>
         <p:txBody>
@@ -3144,6 +3172,75 @@
           </a:p>
         </p:txBody>
       </p:sp>
+      <p:sp>
+        <p:nvSpPr>
+          <p:cNvPr id="11" name="Text Placeholder 10">
+            <a:extLst>
+              <a:ext uri="{FF2B5EF4-FFF2-40B4-BE49-F238E27FC236}">
+                <a16:creationId xmlns:a16="http://schemas.microsoft.com/office/drawing/2014/main" id="{A3972045-4195-489E-A5E2-E1EC080EBEA0}"/>
+              </a:ext>
+            </a:extLst>
+          </p:cNvPr>
+          <p:cNvSpPr>
+            <a:spLocks noGrp="1"/>
+          </p:cNvSpPr>
+          <p:nvPr>
+            <p:ph type="body" sz="quarter" idx="13" hasCustomPrompt="1"/>
+          </p:nvPr>
+        </p:nvSpPr>
+        <p:spPr>
+          <a:xfrm>
+            <a:off x="4800600" y="5521325"/>
+            <a:ext cx="6483350" cy="693738"/>
+          </a:xfrm>
+        </p:spPr>
+        <p:txBody>
+          <a:bodyPr/>
+          <a:lstStyle>
+            <a:lvl1pPr>
+              <a:defRPr/>
+            </a:lvl1pPr>
+          </a:lstStyle>
+          <a:p>
+            <a:pPr lvl="0"/>
+            <a:r>
+              <a:rPr lang="en-US" dirty="0"/>
+              <a:t>Text</a:t>
+            </a:r>
+            <a:endParaRPr lang="en-GB" dirty="0"/>
+          </a:p>
+        </p:txBody>
+      </p:sp>
+      <p:pic>
+        <p:nvPicPr>
+          <p:cNvPr id="12" name="Picture 11">
+            <a:extLst>
+              <a:ext uri="{FF2B5EF4-FFF2-40B4-BE49-F238E27FC236}">
+                <a16:creationId xmlns:a16="http://schemas.microsoft.com/office/drawing/2014/main" id="{1890AD96-E486-40A5-9D5C-6457228BBBCF}"/>
+              </a:ext>
+            </a:extLst>
+          </p:cNvPr>
+          <p:cNvPicPr>
+            <a:picLocks noChangeAspect="1"/>
+          </p:cNvPicPr>
+          <p:nvPr userDrawn="1"/>
+        </p:nvPicPr>
+        <p:blipFill>
+          <a:blip r:embed="rId2"/>
+          <a:stretch>
+            <a:fillRect/>
+          </a:stretch>
+        </p:blipFill>
+        <p:spPr>
+          <a:xfrm>
+            <a:off x="9445012" y="6119566"/>
+            <a:ext cx="2746972" cy="738434"/>
+          </a:xfrm>
+          <a:prstGeom prst="rect">
+            <a:avLst/>
+          </a:prstGeom>
+        </p:spPr>
+      </p:pic>
     </p:spTree>
     <p:extLst>
       <p:ext uri="{BB962C8B-B14F-4D97-AF65-F5344CB8AC3E}">
@@ -4428,6 +4525,468 @@
 </p:sld>
 </file>
 
+<file path=ppt/slides/slide10.xml><?xml version="1.0" encoding="utf-8"?>
+<p:sld xmlns:a="http://schemas.openxmlformats.org/drawingml/2006/main" xmlns:r="http://schemas.openxmlformats.org/officeDocument/2006/relationships" xmlns:p="http://schemas.openxmlformats.org/presentationml/2006/main">
+  <p:cSld>
+    <p:spTree>
+      <p:nvGrpSpPr>
+        <p:cNvPr id="1" name=""/>
+        <p:cNvGrpSpPr/>
+        <p:nvPr/>
+      </p:nvGrpSpPr>
+      <p:grpSpPr>
+        <a:xfrm>
+          <a:off x="0" y="0"/>
+          <a:ext cx="0" cy="0"/>
+          <a:chOff x="0" y="0"/>
+          <a:chExt cx="0" cy="0"/>
+        </a:xfrm>
+      </p:grpSpPr>
+      <p:sp>
+        <p:nvSpPr>
+          <p:cNvPr id="2" name="Title 1">
+            <a:extLst>
+              <a:ext uri="{FF2B5EF4-FFF2-40B4-BE49-F238E27FC236}">
+                <a16:creationId xmlns:a16="http://schemas.microsoft.com/office/drawing/2014/main" id="{8942B4A0-F150-405A-9068-8F7612F09AE0}"/>
+              </a:ext>
+            </a:extLst>
+          </p:cNvPr>
+          <p:cNvSpPr>
+            <a:spLocks noGrp="1"/>
+          </p:cNvSpPr>
+          <p:nvPr>
+            <p:ph type="title"/>
+          </p:nvPr>
+        </p:nvSpPr>
+        <p:spPr/>
+        <p:txBody>
+          <a:bodyPr/>
+          <a:lstStyle/>
+          <a:p>
+            <a:r>
+              <a:rPr lang="en-GB" dirty="0"/>
+              <a:t>Conclusions</a:t>
+            </a:r>
+          </a:p>
+        </p:txBody>
+      </p:sp>
+      <p:sp>
+        <p:nvSpPr>
+          <p:cNvPr id="3" name="Content Placeholder 2">
+            <a:extLst>
+              <a:ext uri="{FF2B5EF4-FFF2-40B4-BE49-F238E27FC236}">
+                <a16:creationId xmlns:a16="http://schemas.microsoft.com/office/drawing/2014/main" id="{AC53D448-2676-4126-B047-DB0C6E8D4412}"/>
+              </a:ext>
+            </a:extLst>
+          </p:cNvPr>
+          <p:cNvSpPr>
+            <a:spLocks noGrp="1"/>
+          </p:cNvSpPr>
+          <p:nvPr>
+            <p:ph idx="1"/>
+          </p:nvPr>
+        </p:nvSpPr>
+        <p:spPr/>
+        <p:txBody>
+          <a:bodyPr>
+            <a:normAutofit/>
+          </a:bodyPr>
+          <a:lstStyle/>
+          <a:p>
+            <a:pPr>
+              <a:buFont typeface="Arial" panose="020B0604020202020204" pitchFamily="34" charset="0"/>
+              <a:buChar char="•"/>
+            </a:pPr>
+            <a:r>
+              <a:rPr lang="en-GB" sz="2800" dirty="0"/>
+              <a:t> Introduction</a:t>
+            </a:r>
+          </a:p>
+          <a:p>
+            <a:pPr>
+              <a:buFont typeface="Arial" panose="020B0604020202020204" pitchFamily="34" charset="0"/>
+              <a:buChar char="•"/>
+            </a:pPr>
+            <a:r>
+              <a:rPr lang="en-GB" sz="2800" b="1" dirty="0"/>
+              <a:t> </a:t>
+            </a:r>
+            <a:r>
+              <a:rPr lang="en-GB" sz="2800" dirty="0"/>
+              <a:t>Methods</a:t>
+            </a:r>
+          </a:p>
+          <a:p>
+            <a:pPr>
+              <a:buFont typeface="Arial" panose="020B0604020202020204" pitchFamily="34" charset="0"/>
+              <a:buChar char="•"/>
+            </a:pPr>
+            <a:r>
+              <a:rPr lang="en-GB" sz="2800" dirty="0"/>
+              <a:t> Rigid Rod Simulations</a:t>
+            </a:r>
+          </a:p>
+          <a:p>
+            <a:pPr>
+              <a:buFont typeface="Arial" panose="020B0604020202020204" pitchFamily="34" charset="0"/>
+              <a:buChar char="•"/>
+            </a:pPr>
+            <a:r>
+              <a:rPr lang="en-GB" sz="2800" dirty="0"/>
+              <a:t> Nunchuck Simulations </a:t>
+            </a:r>
+          </a:p>
+          <a:p>
+            <a:pPr>
+              <a:buFont typeface="Arial" panose="020B0604020202020204" pitchFamily="34" charset="0"/>
+              <a:buChar char="•"/>
+            </a:pPr>
+            <a:r>
+              <a:rPr lang="en-GB" sz="2800" dirty="0"/>
+              <a:t> </a:t>
+            </a:r>
+            <a:r>
+              <a:rPr lang="en-GB" sz="2800" b="1" dirty="0"/>
+              <a:t>Conclusions</a:t>
+            </a:r>
+          </a:p>
+          <a:p>
+            <a:pPr lvl="1">
+              <a:buFont typeface="Arial" panose="020B0604020202020204" pitchFamily="34" charset="0"/>
+              <a:buChar char="•"/>
+            </a:pPr>
+            <a:r>
+              <a:rPr lang="en-GB" sz="2600" i="1" dirty="0"/>
+              <a:t>Primary Findings</a:t>
+            </a:r>
+          </a:p>
+          <a:p>
+            <a:pPr lvl="1">
+              <a:buFont typeface="Arial" panose="020B0604020202020204" pitchFamily="34" charset="0"/>
+              <a:buChar char="•"/>
+            </a:pPr>
+            <a:r>
+              <a:rPr lang="en-GB" sz="2600" i="1" dirty="0"/>
+              <a:t>Further Work</a:t>
+            </a:r>
+            <a:endParaRPr lang="en-GB" sz="2600" dirty="0"/>
+          </a:p>
+          <a:p>
+            <a:endParaRPr lang="en-GB" dirty="0"/>
+          </a:p>
+        </p:txBody>
+      </p:sp>
+      <p:sp>
+        <p:nvSpPr>
+          <p:cNvPr id="7" name="Date Placeholder 6">
+            <a:extLst>
+              <a:ext uri="{FF2B5EF4-FFF2-40B4-BE49-F238E27FC236}">
+                <a16:creationId xmlns:a16="http://schemas.microsoft.com/office/drawing/2014/main" id="{A899C2D9-963B-4A7D-B350-213AC1754454}"/>
+              </a:ext>
+            </a:extLst>
+          </p:cNvPr>
+          <p:cNvSpPr>
+            <a:spLocks noGrp="1"/>
+          </p:cNvSpPr>
+          <p:nvPr>
+            <p:ph type="dt" sz="half" idx="10"/>
+          </p:nvPr>
+        </p:nvSpPr>
+        <p:spPr/>
+        <p:txBody>
+          <a:bodyPr/>
+          <a:lstStyle/>
+          <a:p>
+            <a:fld id="{7F35EB2B-3FCE-4F7C-945F-B528C12B6B66}" type="datetime1">
+              <a:rPr lang="en-GB" smtClean="0"/>
+              <a:t>06/05/2021</a:t>
+            </a:fld>
+            <a:endParaRPr lang="en-GB"/>
+          </a:p>
+        </p:txBody>
+      </p:sp>
+      <p:sp>
+        <p:nvSpPr>
+          <p:cNvPr id="8" name="Footer Placeholder 7">
+            <a:extLst>
+              <a:ext uri="{FF2B5EF4-FFF2-40B4-BE49-F238E27FC236}">
+                <a16:creationId xmlns:a16="http://schemas.microsoft.com/office/drawing/2014/main" id="{5B41B150-3135-4FDE-9CE6-C3447A401A81}"/>
+              </a:ext>
+            </a:extLst>
+          </p:cNvPr>
+          <p:cNvSpPr>
+            <a:spLocks noGrp="1"/>
+          </p:cNvSpPr>
+          <p:nvPr>
+            <p:ph type="ftr" sz="quarter" idx="11"/>
+          </p:nvPr>
+        </p:nvSpPr>
+        <p:spPr/>
+        <p:txBody>
+          <a:bodyPr/>
+          <a:lstStyle/>
+          <a:p>
+            <a:r>
+              <a:rPr lang="en-GB"/>
+              <a:t>Simulating Liqyuid Crystals</a:t>
+            </a:r>
+          </a:p>
+        </p:txBody>
+      </p:sp>
+      <p:sp>
+        <p:nvSpPr>
+          <p:cNvPr id="9" name="Slide Number Placeholder 8">
+            <a:extLst>
+              <a:ext uri="{FF2B5EF4-FFF2-40B4-BE49-F238E27FC236}">
+                <a16:creationId xmlns:a16="http://schemas.microsoft.com/office/drawing/2014/main" id="{8CDB5539-7981-43FC-A4B3-45CFD7FCFCDE}"/>
+              </a:ext>
+            </a:extLst>
+          </p:cNvPr>
+          <p:cNvSpPr>
+            <a:spLocks noGrp="1"/>
+          </p:cNvSpPr>
+          <p:nvPr>
+            <p:ph type="sldNum" sz="quarter" idx="12"/>
+          </p:nvPr>
+        </p:nvSpPr>
+        <p:spPr/>
+        <p:txBody>
+          <a:bodyPr/>
+          <a:lstStyle/>
+          <a:p>
+            <a:fld id="{AB645ECC-7A7A-4729-8128-50B722794741}" type="slidenum">
+              <a:rPr lang="en-GB" smtClean="0"/>
+              <a:t>10</a:t>
+            </a:fld>
+            <a:endParaRPr lang="en-GB"/>
+          </a:p>
+        </p:txBody>
+      </p:sp>
+    </p:spTree>
+    <p:extLst>
+      <p:ext uri="{BB962C8B-B14F-4D97-AF65-F5344CB8AC3E}">
+        <p14:creationId xmlns:p14="http://schemas.microsoft.com/office/powerpoint/2010/main" val="4282608364"/>
+      </p:ext>
+    </p:extLst>
+  </p:cSld>
+  <p:clrMapOvr>
+    <a:masterClrMapping/>
+  </p:clrMapOvr>
+</p:sld>
+</file>
+
+<file path=ppt/slides/slide11.xml><?xml version="1.0" encoding="utf-8"?>
+<p:sld xmlns:a="http://schemas.openxmlformats.org/drawingml/2006/main" xmlns:r="http://schemas.openxmlformats.org/officeDocument/2006/relationships" xmlns:p="http://schemas.openxmlformats.org/presentationml/2006/main">
+  <p:cSld>
+    <p:spTree>
+      <p:nvGrpSpPr>
+        <p:cNvPr id="1" name=""/>
+        <p:cNvGrpSpPr/>
+        <p:nvPr/>
+      </p:nvGrpSpPr>
+      <p:grpSpPr>
+        <a:xfrm>
+          <a:off x="0" y="0"/>
+          <a:ext cx="0" cy="0"/>
+          <a:chOff x="0" y="0"/>
+          <a:chExt cx="0" cy="0"/>
+        </a:xfrm>
+      </p:grpSpPr>
+      <p:sp>
+        <p:nvSpPr>
+          <p:cNvPr id="2" name="Title 1">
+            <a:extLst>
+              <a:ext uri="{FF2B5EF4-FFF2-40B4-BE49-F238E27FC236}">
+                <a16:creationId xmlns:a16="http://schemas.microsoft.com/office/drawing/2014/main" id="{0A31ED90-FB80-42B2-B1B3-6B1B614B65EF}"/>
+              </a:ext>
+            </a:extLst>
+          </p:cNvPr>
+          <p:cNvSpPr>
+            <a:spLocks noGrp="1"/>
+          </p:cNvSpPr>
+          <p:nvPr>
+            <p:ph type="title"/>
+          </p:nvPr>
+        </p:nvSpPr>
+        <p:spPr/>
+        <p:txBody>
+          <a:bodyPr/>
+          <a:lstStyle/>
+          <a:p>
+            <a:r>
+              <a:rPr lang="en-GB" dirty="0"/>
+              <a:t>References</a:t>
+            </a:r>
+          </a:p>
+        </p:txBody>
+      </p:sp>
+      <p:sp>
+        <p:nvSpPr>
+          <p:cNvPr id="3" name="Content Placeholder 2">
+            <a:extLst>
+              <a:ext uri="{FF2B5EF4-FFF2-40B4-BE49-F238E27FC236}">
+                <a16:creationId xmlns:a16="http://schemas.microsoft.com/office/drawing/2014/main" id="{C003DBD8-7BF5-4F3F-B759-1CCB51E33DB1}"/>
+              </a:ext>
+            </a:extLst>
+          </p:cNvPr>
+          <p:cNvSpPr>
+            <a:spLocks noGrp="1"/>
+          </p:cNvSpPr>
+          <p:nvPr>
+            <p:ph idx="1"/>
+          </p:nvPr>
+        </p:nvSpPr>
+        <p:spPr/>
+        <p:txBody>
+          <a:bodyPr/>
+          <a:lstStyle/>
+          <a:p>
+            <a:r>
+              <a:rPr lang="en-GB" b="0" i="0" baseline="30000" dirty="0">
+                <a:solidFill>
+                  <a:srgbClr val="666666"/>
+                </a:solidFill>
+                <a:effectLst/>
+                <a:latin typeface="Arial" panose="020B0604020202020204" pitchFamily="34" charset="0"/>
+              </a:rPr>
+              <a:t>1 </a:t>
+            </a:r>
+            <a:r>
+              <a:rPr lang="en-GB" b="0" i="0" dirty="0">
+                <a:solidFill>
+                  <a:srgbClr val="666666"/>
+                </a:solidFill>
+                <a:effectLst/>
+                <a:latin typeface="Arial" panose="020B0604020202020204" pitchFamily="34" charset="0"/>
+              </a:rPr>
+              <a:t>T. Kato, Y. Hirai, S. </a:t>
+            </a:r>
+            <a:r>
+              <a:rPr lang="en-GB" b="0" i="0" dirty="0" err="1">
+                <a:solidFill>
+                  <a:srgbClr val="666666"/>
+                </a:solidFill>
+                <a:effectLst/>
+                <a:latin typeface="Arial" panose="020B0604020202020204" pitchFamily="34" charset="0"/>
+              </a:rPr>
+              <a:t>Nakaso</a:t>
+            </a:r>
+            <a:r>
+              <a:rPr lang="en-GB" b="0" i="0" dirty="0">
+                <a:solidFill>
+                  <a:srgbClr val="666666"/>
+                </a:solidFill>
+                <a:effectLst/>
+                <a:latin typeface="Arial" panose="020B0604020202020204" pitchFamily="34" charset="0"/>
+              </a:rPr>
+              <a:t>, and M. Moriyama, Liquid-Crystalline Physical Gels, Chem. Soc. Rev. 36, 1857 (2007).</a:t>
+            </a:r>
+            <a:endParaRPr lang="en-GB" dirty="0"/>
+          </a:p>
+          <a:p>
+            <a:endParaRPr lang="en-GB" dirty="0"/>
+          </a:p>
+        </p:txBody>
+      </p:sp>
+      <p:sp>
+        <p:nvSpPr>
+          <p:cNvPr id="4" name="Date Placeholder 3">
+            <a:extLst>
+              <a:ext uri="{FF2B5EF4-FFF2-40B4-BE49-F238E27FC236}">
+                <a16:creationId xmlns:a16="http://schemas.microsoft.com/office/drawing/2014/main" id="{45E110CB-4FC8-455C-A409-7376F083CE2D}"/>
+              </a:ext>
+            </a:extLst>
+          </p:cNvPr>
+          <p:cNvSpPr>
+            <a:spLocks noGrp="1"/>
+          </p:cNvSpPr>
+          <p:nvPr>
+            <p:ph type="dt" sz="half" idx="10"/>
+          </p:nvPr>
+        </p:nvSpPr>
+        <p:spPr/>
+        <p:txBody>
+          <a:bodyPr/>
+          <a:lstStyle/>
+          <a:p>
+            <a:fld id="{7F253374-1CF5-427D-922B-09BFB2E7CA63}" type="datetime1">
+              <a:rPr lang="en-GB" smtClean="0"/>
+              <a:t>06/05/2021</a:t>
+            </a:fld>
+            <a:endParaRPr lang="en-GB"/>
+          </a:p>
+        </p:txBody>
+      </p:sp>
+      <p:sp>
+        <p:nvSpPr>
+          <p:cNvPr id="5" name="Footer Placeholder 4">
+            <a:extLst>
+              <a:ext uri="{FF2B5EF4-FFF2-40B4-BE49-F238E27FC236}">
+                <a16:creationId xmlns:a16="http://schemas.microsoft.com/office/drawing/2014/main" id="{BD7A2662-75BF-49DB-A5BA-E48A6A084A9A}"/>
+              </a:ext>
+            </a:extLst>
+          </p:cNvPr>
+          <p:cNvSpPr>
+            <a:spLocks noGrp="1"/>
+          </p:cNvSpPr>
+          <p:nvPr>
+            <p:ph type="ftr" sz="quarter" idx="11"/>
+          </p:nvPr>
+        </p:nvSpPr>
+        <p:spPr/>
+        <p:txBody>
+          <a:bodyPr/>
+          <a:lstStyle/>
+          <a:p>
+            <a:r>
+              <a:rPr lang="en-GB"/>
+              <a:t>Simulating Liqyuid Crystals</a:t>
+            </a:r>
+          </a:p>
+        </p:txBody>
+      </p:sp>
+      <p:sp>
+        <p:nvSpPr>
+          <p:cNvPr id="6" name="Slide Number Placeholder 5">
+            <a:extLst>
+              <a:ext uri="{FF2B5EF4-FFF2-40B4-BE49-F238E27FC236}">
+                <a16:creationId xmlns:a16="http://schemas.microsoft.com/office/drawing/2014/main" id="{046CAC3D-4F68-4DD3-97E3-51A43FBC4F95}"/>
+              </a:ext>
+            </a:extLst>
+          </p:cNvPr>
+          <p:cNvSpPr>
+            <a:spLocks noGrp="1"/>
+          </p:cNvSpPr>
+          <p:nvPr>
+            <p:ph type="sldNum" sz="quarter" idx="12"/>
+          </p:nvPr>
+        </p:nvSpPr>
+        <p:spPr/>
+        <p:txBody>
+          <a:bodyPr/>
+          <a:lstStyle/>
+          <a:p>
+            <a:fld id="{AB645ECC-7A7A-4729-8128-50B722794741}" type="slidenum">
+              <a:rPr lang="en-GB" smtClean="0"/>
+              <a:t>11</a:t>
+            </a:fld>
+            <a:endParaRPr lang="en-GB"/>
+          </a:p>
+        </p:txBody>
+      </p:sp>
+    </p:spTree>
+    <p:extLst>
+      <p:ext uri="{BB962C8B-B14F-4D97-AF65-F5344CB8AC3E}">
+        <p14:creationId xmlns:p14="http://schemas.microsoft.com/office/powerpoint/2010/main" val="4253407361"/>
+      </p:ext>
+    </p:extLst>
+  </p:cSld>
+  <p:clrMapOvr>
+    <a:masterClrMapping/>
+  </p:clrMapOvr>
+</p:sld>
+</file>
+
 <file path=ppt/slides/slide2.xml><?xml version="1.0" encoding="utf-8"?>
 <p:sld xmlns:a="http://schemas.openxmlformats.org/drawingml/2006/main" xmlns:r="http://schemas.openxmlformats.org/officeDocument/2006/relationships" xmlns:p="http://schemas.openxmlformats.org/presentationml/2006/main">
   <p:cSld>
@@ -4516,7 +5075,7 @@
             </a:pPr>
             <a:r>
               <a:rPr lang="en-GB" sz="2400" i="1" dirty="0"/>
-              <a:t>Liquid Crystals (and their applications)</a:t>
+              <a:t>Liquid Crystals </a:t>
             </a:r>
           </a:p>
           <a:p>
@@ -4730,6 +5289,14 @@
 <file path=ppt/slides/slide3.xml><?xml version="1.0" encoding="utf-8"?>
 <p:sld xmlns:a="http://schemas.openxmlformats.org/drawingml/2006/main" xmlns:r="http://schemas.openxmlformats.org/officeDocument/2006/relationships" xmlns:p="http://schemas.openxmlformats.org/presentationml/2006/main">
   <p:cSld>
+    <p:bg>
+      <p:bgPr>
+        <a:solidFill>
+          <a:schemeClr val="bg1"/>
+        </a:solidFill>
+        <a:effectLst/>
+      </p:bgPr>
+    </p:bg>
     <p:spTree>
       <p:nvGrpSpPr>
         <p:cNvPr id="1" name=""/>
@@ -4762,11 +5329,17 @@
         </p:nvSpPr>
         <p:spPr/>
         <p:txBody>
-          <a:bodyPr/>
-          <a:lstStyle/>
-          <a:p>
-            <a:r>
-              <a:rPr lang="en-GB" dirty="0"/>
+          <a:bodyPr>
+            <a:normAutofit/>
+          </a:bodyPr>
+          <a:lstStyle/>
+          <a:p>
+            <a:r>
+              <a:rPr lang="en-GB" sz="3600">
+                <a:solidFill>
+                  <a:srgbClr val="FFFFFF"/>
+                </a:solidFill>
+              </a:rPr>
               <a:t>Liquid Crystals</a:t>
             </a:r>
           </a:p>
@@ -4774,10 +5347,10 @@
       </p:sp>
       <p:sp>
         <p:nvSpPr>
-          <p:cNvPr id="3" name="Content Placeholder 2">
+          <p:cNvPr id="9" name="Text Placeholder 8">
             <a:extLst>
               <a:ext uri="{FF2B5EF4-FFF2-40B4-BE49-F238E27FC236}">
-                <a16:creationId xmlns:a16="http://schemas.microsoft.com/office/drawing/2014/main" id="{93C58F7F-5B42-4339-AD8C-F266D21C2766}"/>
+                <a16:creationId xmlns:a16="http://schemas.microsoft.com/office/drawing/2014/main" id="{267B10D7-A625-404C-A522-AE2978E10D82}"/>
               </a:ext>
             </a:extLst>
           </p:cNvPr>
@@ -4785,15 +5358,56 @@
             <a:spLocks noGrp="1"/>
           </p:cNvSpPr>
           <p:nvPr>
-            <p:ph idx="1"/>
-          </p:nvPr>
-        </p:nvSpPr>
-        <p:spPr/>
-        <p:txBody>
-          <a:bodyPr/>
-          <a:lstStyle/>
-          <a:p>
-            <a:endParaRPr lang="en-GB" dirty="0"/>
+            <p:ph type="body" sz="half" idx="2"/>
+          </p:nvPr>
+        </p:nvSpPr>
+        <p:spPr>
+          <a:xfrm>
+            <a:off x="457200" y="5406500"/>
+            <a:ext cx="3200400" cy="898703"/>
+          </a:xfrm>
+        </p:spPr>
+        <p:txBody>
+          <a:bodyPr>
+            <a:normAutofit lnSpcReduction="10000"/>
+          </a:bodyPr>
+          <a:lstStyle/>
+          <a:p>
+            <a:r>
+              <a:rPr lang="en-GB" b="0" i="0" dirty="0">
+                <a:solidFill>
+                  <a:schemeClr val="bg1"/>
+                </a:solidFill>
+                <a:effectLst/>
+                <a:latin typeface="Arial" panose="020B0604020202020204" pitchFamily="34" charset="0"/>
+              </a:rPr>
+              <a:t>[1] T. Kato, Y. Hirai, S. </a:t>
+            </a:r>
+            <a:r>
+              <a:rPr lang="en-GB" b="0" i="0" dirty="0" err="1">
+                <a:solidFill>
+                  <a:schemeClr val="bg1"/>
+                </a:solidFill>
+                <a:effectLst/>
+                <a:latin typeface="Arial" panose="020B0604020202020204" pitchFamily="34" charset="0"/>
+              </a:rPr>
+              <a:t>Nakaso</a:t>
+            </a:r>
+            <a:r>
+              <a:rPr lang="en-GB" b="0" i="0" dirty="0">
+                <a:solidFill>
+                  <a:schemeClr val="bg1"/>
+                </a:solidFill>
+                <a:effectLst/>
+                <a:latin typeface="Arial" panose="020B0604020202020204" pitchFamily="34" charset="0"/>
+              </a:rPr>
+              <a:t>, and M. Moriyama, Liquid-Crystalline Physical Gels, Chem. Soc. Rev. 36, 1857 (2007).</a:t>
+            </a:r>
+            <a:endParaRPr lang="en-GB" dirty="0">
+              <a:solidFill>
+                <a:schemeClr val="bg1"/>
+              </a:solidFill>
+            </a:endParaRPr>
           </a:p>
         </p:txBody>
       </p:sp>
@@ -4815,11 +5429,23 @@
         </p:nvSpPr>
         <p:spPr/>
         <p:txBody>
-          <a:bodyPr/>
-          <a:lstStyle/>
-          <a:p>
+          <a:bodyPr>
+            <a:normAutofit/>
+          </a:bodyPr>
+          <a:lstStyle/>
+          <a:p>
+            <a:pPr algn="r">
+              <a:spcAft>
+                <a:spcPts val="600"/>
+              </a:spcAft>
+            </a:pPr>
             <a:fld id="{7F253374-1CF5-427D-922B-09BFB2E7CA63}" type="datetime1">
               <a:rPr lang="en-GB" smtClean="0"/>
+              <a:pPr algn="r">
+                <a:spcAft>
+                  <a:spcPts val="600"/>
+                </a:spcAft>
+              </a:pPr>
               <a:t>06/05/2021</a:t>
             </a:fld>
             <a:endParaRPr lang="en-GB"/>
@@ -4844,9 +5470,16 @@
         </p:nvSpPr>
         <p:spPr/>
         <p:txBody>
-          <a:bodyPr/>
-          <a:lstStyle/>
-          <a:p>
+          <a:bodyPr>
+            <a:normAutofit/>
+          </a:bodyPr>
+          <a:lstStyle/>
+          <a:p>
+            <a:pPr algn="l">
+              <a:spcAft>
+                <a:spcPts val="600"/>
+              </a:spcAft>
+            </a:pPr>
             <a:r>
               <a:rPr lang="en-GB"/>
               <a:t>Simulating Liqyuid Crystals</a:t>
@@ -4872,17 +5505,337 @@
         </p:nvSpPr>
         <p:spPr/>
         <p:txBody>
-          <a:bodyPr/>
-          <a:lstStyle/>
-          <a:p>
+          <a:bodyPr>
+            <a:normAutofit/>
+          </a:bodyPr>
+          <a:lstStyle/>
+          <a:p>
+            <a:pPr>
+              <a:spcAft>
+                <a:spcPts val="600"/>
+              </a:spcAft>
+            </a:pPr>
             <a:fld id="{AB645ECC-7A7A-4729-8128-50B722794741}" type="slidenum">
-              <a:rPr lang="en-GB" smtClean="0"/>
+              <a:rPr lang="en-GB">
+                <a:solidFill>
+                  <a:schemeClr val="tx2"/>
+                </a:solidFill>
+              </a:rPr>
+              <a:pPr>
+                <a:spcAft>
+                  <a:spcPts val="600"/>
+                </a:spcAft>
+              </a:pPr>
               <a:t>3</a:t>
             </a:fld>
-            <a:endParaRPr lang="en-GB"/>
-          </a:p>
-        </p:txBody>
-      </p:sp>
+            <a:endParaRPr lang="en-GB">
+              <a:solidFill>
+                <a:schemeClr val="tx2"/>
+              </a:solidFill>
+            </a:endParaRPr>
+          </a:p>
+        </p:txBody>
+      </p:sp>
+      <p:sp>
+        <p:nvSpPr>
+          <p:cNvPr id="10" name="Text Placeholder 9">
+            <a:extLst>
+              <a:ext uri="{FF2B5EF4-FFF2-40B4-BE49-F238E27FC236}">
+                <a16:creationId xmlns:a16="http://schemas.microsoft.com/office/drawing/2014/main" id="{18B839E2-B265-48CA-AD88-7FAB29520AE8}"/>
+              </a:ext>
+            </a:extLst>
+          </p:cNvPr>
+          <p:cNvSpPr>
+            <a:spLocks noGrp="1"/>
+          </p:cNvSpPr>
+          <p:nvPr>
+            <p:ph type="body" sz="quarter" idx="13"/>
+          </p:nvPr>
+        </p:nvSpPr>
+        <p:spPr>
+          <a:xfrm>
+            <a:off x="4587535" y="5211056"/>
+            <a:ext cx="7335175" cy="1128158"/>
+          </a:xfrm>
+        </p:spPr>
+        <p:txBody>
+          <a:bodyPr>
+            <a:normAutofit fontScale="92500" lnSpcReduction="10000"/>
+          </a:bodyPr>
+          <a:lstStyle/>
+          <a:p>
+            <a:r>
+              <a:rPr lang="en-GB" i="1" dirty="0"/>
+              <a:t>Figure 1: Representation of the three liquid crystal phase classes, reproduced from Kato et al. [1] with permission. Note the distinct layers in the smectic and columnar phases, and the different class of molecule in the columnar phase. </a:t>
+            </a:r>
+          </a:p>
+        </p:txBody>
+      </p:sp>
+      <p:grpSp>
+        <p:nvGrpSpPr>
+          <p:cNvPr id="22" name="Group 21">
+            <a:extLst>
+              <a:ext uri="{FF2B5EF4-FFF2-40B4-BE49-F238E27FC236}">
+                <a16:creationId xmlns:a16="http://schemas.microsoft.com/office/drawing/2014/main" id="{D0D7F136-F76A-49C8-A47E-2348B024E5D4}"/>
+              </a:ext>
+            </a:extLst>
+          </p:cNvPr>
+          <p:cNvGrpSpPr/>
+          <p:nvPr/>
+        </p:nvGrpSpPr>
+        <p:grpSpPr>
+          <a:xfrm>
+            <a:off x="5157386" y="576603"/>
+            <a:ext cx="6055097" cy="4479536"/>
+            <a:chOff x="5157386" y="576603"/>
+            <a:chExt cx="6055097" cy="4479536"/>
+          </a:xfrm>
+        </p:grpSpPr>
+        <p:pic>
+          <p:nvPicPr>
+            <p:cNvPr id="8" name="Picture 7">
+              <a:extLst>
+                <a:ext uri="{FF2B5EF4-FFF2-40B4-BE49-F238E27FC236}">
+                  <a16:creationId xmlns:a16="http://schemas.microsoft.com/office/drawing/2014/main" id="{D0BF595E-5845-487A-8251-5AF96FD95FB9}"/>
+                </a:ext>
+              </a:extLst>
+            </p:cNvPr>
+            <p:cNvPicPr>
+              <a:picLocks noChangeAspect="1"/>
+            </p:cNvPicPr>
+            <p:nvPr/>
+          </p:nvPicPr>
+          <p:blipFill>
+            <a:blip r:embed="rId2">
+              <a:extLst>
+                <a:ext uri="{28A0092B-C50C-407E-A947-70E740481C1C}">
+                  <a14:useLocalDpi xmlns:a14="http://schemas.microsoft.com/office/drawing/2010/main" val="0"/>
+                </a:ext>
+              </a:extLst>
+            </a:blip>
+            <a:stretch>
+              <a:fillRect/>
+            </a:stretch>
+          </p:blipFill>
+          <p:spPr>
+            <a:xfrm>
+              <a:off x="5157386" y="576603"/>
+              <a:ext cx="6055097" cy="4479536"/>
+            </a:xfrm>
+            <a:prstGeom prst="rect">
+              <a:avLst/>
+            </a:prstGeom>
+          </p:spPr>
+        </p:pic>
+        <p:sp>
+          <p:nvSpPr>
+            <p:cNvPr id="11" name="Rectangle 10">
+              <a:extLst>
+                <a:ext uri="{FF2B5EF4-FFF2-40B4-BE49-F238E27FC236}">
+                  <a16:creationId xmlns:a16="http://schemas.microsoft.com/office/drawing/2014/main" id="{14B78825-6332-4798-BFF4-7E7DDFCF6FD8}"/>
+                </a:ext>
+              </a:extLst>
+            </p:cNvPr>
+            <p:cNvSpPr/>
+            <p:nvPr/>
+          </p:nvSpPr>
+          <p:spPr>
+            <a:xfrm>
+              <a:off x="6459346" y="1494995"/>
+              <a:ext cx="719091" cy="257453"/>
+            </a:xfrm>
+            <a:prstGeom prst="rect">
+              <a:avLst/>
+            </a:prstGeom>
+            <a:solidFill>
+              <a:schemeClr val="bg1"/>
+            </a:solidFill>
+            <a:ln>
+              <a:noFill/>
+            </a:ln>
+          </p:spPr>
+          <p:style>
+            <a:lnRef idx="2">
+              <a:schemeClr val="accent1">
+                <a:shade val="50000"/>
+              </a:schemeClr>
+            </a:lnRef>
+            <a:fillRef idx="1">
+              <a:schemeClr val="accent1"/>
+            </a:fillRef>
+            <a:effectRef idx="0">
+              <a:schemeClr val="accent1"/>
+            </a:effectRef>
+            <a:fontRef idx="minor">
+              <a:schemeClr val="lt1"/>
+            </a:fontRef>
+          </p:style>
+          <p:txBody>
+            <a:bodyPr rtlCol="0" anchor="ctr"/>
+            <a:lstStyle/>
+            <a:p>
+              <a:pPr algn="ctr"/>
+              <a:endParaRPr lang="en-GB" dirty="0"/>
+            </a:p>
+          </p:txBody>
+        </p:sp>
+        <p:sp>
+          <p:nvSpPr>
+            <p:cNvPr id="16" name="Rectangle 15">
+              <a:extLst>
+                <a:ext uri="{FF2B5EF4-FFF2-40B4-BE49-F238E27FC236}">
+                  <a16:creationId xmlns:a16="http://schemas.microsoft.com/office/drawing/2014/main" id="{CCA656C0-04BD-407A-9B22-30C6F753F10C}"/>
+                </a:ext>
+              </a:extLst>
+            </p:cNvPr>
+            <p:cNvSpPr/>
+            <p:nvPr/>
+          </p:nvSpPr>
+          <p:spPr>
+            <a:xfrm>
+              <a:off x="6405609" y="937035"/>
+              <a:ext cx="719091" cy="257453"/>
+            </a:xfrm>
+            <a:prstGeom prst="rect">
+              <a:avLst/>
+            </a:prstGeom>
+            <a:solidFill>
+              <a:schemeClr val="bg1"/>
+            </a:solidFill>
+            <a:ln>
+              <a:noFill/>
+            </a:ln>
+          </p:spPr>
+          <p:style>
+            <a:lnRef idx="2">
+              <a:schemeClr val="accent1">
+                <a:shade val="50000"/>
+              </a:schemeClr>
+            </a:lnRef>
+            <a:fillRef idx="1">
+              <a:schemeClr val="accent1"/>
+            </a:fillRef>
+            <a:effectRef idx="0">
+              <a:schemeClr val="accent1"/>
+            </a:effectRef>
+            <a:fontRef idx="minor">
+              <a:schemeClr val="lt1"/>
+            </a:fontRef>
+          </p:style>
+          <p:txBody>
+            <a:bodyPr rtlCol="0" anchor="ctr"/>
+            <a:lstStyle/>
+            <a:p>
+              <a:pPr algn="ctr"/>
+              <a:endParaRPr lang="en-GB"/>
+            </a:p>
+          </p:txBody>
+        </p:sp>
+        <p:sp>
+          <p:nvSpPr>
+            <p:cNvPr id="18" name="Rectangle 17">
+              <a:extLst>
+                <a:ext uri="{FF2B5EF4-FFF2-40B4-BE49-F238E27FC236}">
+                  <a16:creationId xmlns:a16="http://schemas.microsoft.com/office/drawing/2014/main" id="{330BA400-55BE-41F6-AD84-7A24FDB527B3}"/>
+                </a:ext>
+              </a:extLst>
+            </p:cNvPr>
+            <p:cNvSpPr/>
+            <p:nvPr/>
+          </p:nvSpPr>
+          <p:spPr>
+            <a:xfrm>
+              <a:off x="9089253" y="1488117"/>
+              <a:ext cx="719091" cy="257453"/>
+            </a:xfrm>
+            <a:prstGeom prst="rect">
+              <a:avLst/>
+            </a:prstGeom>
+            <a:solidFill>
+              <a:schemeClr val="bg1"/>
+            </a:solidFill>
+            <a:ln>
+              <a:noFill/>
+            </a:ln>
+          </p:spPr>
+          <p:style>
+            <a:lnRef idx="2">
+              <a:schemeClr val="accent1">
+                <a:shade val="50000"/>
+              </a:schemeClr>
+            </a:lnRef>
+            <a:fillRef idx="1">
+              <a:schemeClr val="accent1"/>
+            </a:fillRef>
+            <a:effectRef idx="0">
+              <a:schemeClr val="accent1"/>
+            </a:effectRef>
+            <a:fontRef idx="minor">
+              <a:schemeClr val="lt1"/>
+            </a:fontRef>
+          </p:style>
+          <p:txBody>
+            <a:bodyPr rtlCol="0" anchor="ctr"/>
+            <a:lstStyle/>
+            <a:p>
+              <a:pPr algn="ctr"/>
+              <a:endParaRPr lang="en-GB"/>
+            </a:p>
+          </p:txBody>
+        </p:sp>
+        <p:sp>
+          <p:nvSpPr>
+            <p:cNvPr id="19" name="Rectangle 18">
+              <a:extLst>
+                <a:ext uri="{FF2B5EF4-FFF2-40B4-BE49-F238E27FC236}">
+                  <a16:creationId xmlns:a16="http://schemas.microsoft.com/office/drawing/2014/main" id="{2E41D5B6-AD4F-4B84-9837-81E13C406220}"/>
+                </a:ext>
+              </a:extLst>
+            </p:cNvPr>
+            <p:cNvSpPr/>
+            <p:nvPr/>
+          </p:nvSpPr>
+          <p:spPr>
+            <a:xfrm>
+              <a:off x="9089253" y="937034"/>
+              <a:ext cx="719091" cy="257453"/>
+            </a:xfrm>
+            <a:prstGeom prst="rect">
+              <a:avLst/>
+            </a:prstGeom>
+            <a:solidFill>
+              <a:schemeClr val="bg1"/>
+            </a:solidFill>
+            <a:ln>
+              <a:noFill/>
+            </a:ln>
+          </p:spPr>
+          <p:style>
+            <a:lnRef idx="2">
+              <a:schemeClr val="accent1">
+                <a:shade val="50000"/>
+              </a:schemeClr>
+            </a:lnRef>
+            <a:fillRef idx="1">
+              <a:schemeClr val="accent1"/>
+            </a:fillRef>
+            <a:effectRef idx="0">
+              <a:schemeClr val="accent1"/>
+            </a:effectRef>
+            <a:fontRef idx="minor">
+              <a:schemeClr val="lt1"/>
+            </a:fontRef>
+          </p:style>
+          <p:txBody>
+            <a:bodyPr rtlCol="0" anchor="ctr"/>
+            <a:lstStyle/>
+            <a:p>
+              <a:pPr algn="ctr"/>
+              <a:endParaRPr lang="en-GB"/>
+            </a:p>
+          </p:txBody>
+        </p:sp>
+      </p:grpSp>
     </p:spTree>
     <p:extLst>
       <p:ext uri="{BB962C8B-B14F-4D97-AF65-F5344CB8AC3E}">
@@ -4918,7 +5871,7 @@
           <p:cNvPr id="2" name="Title 1">
             <a:extLst>
               <a:ext uri="{FF2B5EF4-FFF2-40B4-BE49-F238E27FC236}">
-                <a16:creationId xmlns:a16="http://schemas.microsoft.com/office/drawing/2014/main" id="{8942B4A0-F150-405A-9068-8F7612F09AE0}"/>
+                <a16:creationId xmlns:a16="http://schemas.microsoft.com/office/drawing/2014/main" id="{89A056DC-77D0-4C7E-9998-81D8A5E2BE92}"/>
               </a:ext>
             </a:extLst>
           </p:cNvPr>
@@ -4936,17 +5889,17 @@
           <a:p>
             <a:r>
               <a:rPr lang="en-GB" dirty="0"/>
-              <a:t>Methods</a:t>
-            </a:r>
-          </a:p>
-        </p:txBody>
-      </p:sp>
-      <p:sp>
-        <p:nvSpPr>
-          <p:cNvPr id="3" name="Content Placeholder 2">
+              <a:t>Phase Transitions</a:t>
+            </a:r>
+          </a:p>
+        </p:txBody>
+      </p:sp>
+      <p:sp>
+        <p:nvSpPr>
+          <p:cNvPr id="9" name="Content Placeholder 8">
             <a:extLst>
               <a:ext uri="{FF2B5EF4-FFF2-40B4-BE49-F238E27FC236}">
-                <a16:creationId xmlns:a16="http://schemas.microsoft.com/office/drawing/2014/main" id="{AC53D448-2676-4126-B047-DB0C6E8D4412}"/>
+                <a16:creationId xmlns:a16="http://schemas.microsoft.com/office/drawing/2014/main" id="{8C079F86-81B7-4A0F-99FD-881B4449FB89}"/>
               </a:ext>
             </a:extLst>
           </p:cNvPr>
@@ -4963,15 +5916,31 @@
             <a:normAutofit/>
           </a:bodyPr>
           <a:lstStyle/>
+          <a:p>
+            <a:pPr marL="0" indent="0">
+              <a:buNone/>
+            </a:pPr>
+            <a:r>
+              <a:rPr lang="en-GB" sz="2800" b="1" dirty="0"/>
+              <a:t> </a:t>
+            </a:r>
+          </a:p>
           <a:p>
             <a:pPr>
               <a:buFont typeface="Arial" panose="020B0604020202020204" pitchFamily="34" charset="0"/>
               <a:buChar char="•"/>
             </a:pPr>
             <a:r>
-              <a:rPr lang="en-GB" sz="2800" dirty="0"/>
-              <a:t> Introduction</a:t>
-            </a:r>
+              <a:rPr lang="en-GB" sz="3200" b="1" dirty="0"/>
+              <a:t> Lyotropic</a:t>
+            </a:r>
+            <a:r>
+              <a:rPr lang="en-GB" sz="3200" dirty="0"/>
+              <a:t> – Induced by changes in concentration</a:t>
+            </a:r>
+          </a:p>
+          <a:p>
+            <a:endParaRPr lang="en-GB" sz="3200" dirty="0"/>
           </a:p>
           <a:p>
             <a:pPr>
@@ -4979,71 +5948,26 @@
               <a:buChar char="•"/>
             </a:pPr>
             <a:r>
-              <a:rPr lang="en-GB" sz="2800" b="1" dirty="0"/>
-              <a:t> Methods</a:t>
-            </a:r>
-          </a:p>
-          <a:p>
-            <a:pPr lvl="1">
-              <a:buFont typeface="Arial" panose="020B0604020202020204" pitchFamily="34" charset="0"/>
-              <a:buChar char="•"/>
-            </a:pPr>
-            <a:r>
-              <a:rPr lang="en-GB" sz="2400" i="1" dirty="0"/>
-              <a:t>LAMMPS Software</a:t>
-            </a:r>
-          </a:p>
-          <a:p>
-            <a:pPr lvl="1">
-              <a:buFont typeface="Arial" panose="020B0604020202020204" pitchFamily="34" charset="0"/>
-              <a:buChar char="•"/>
-            </a:pPr>
-            <a:r>
-              <a:rPr lang="en-GB" sz="2400" i="1" dirty="0"/>
-              <a:t>Nunchuck Molecules</a:t>
-            </a:r>
-          </a:p>
-          <a:p>
-            <a:pPr>
-              <a:buFont typeface="Arial" panose="020B0604020202020204" pitchFamily="34" charset="0"/>
-              <a:buChar char="•"/>
-            </a:pPr>
-            <a:r>
-              <a:rPr lang="en-GB" sz="2800" dirty="0"/>
-              <a:t> Rigid Rod Simulations</a:t>
-            </a:r>
-          </a:p>
-          <a:p>
-            <a:pPr>
-              <a:buFont typeface="Arial" panose="020B0604020202020204" pitchFamily="34" charset="0"/>
-              <a:buChar char="•"/>
-            </a:pPr>
-            <a:r>
-              <a:rPr lang="en-GB" sz="2800" dirty="0"/>
-              <a:t> Nunchuck Simulations </a:t>
-            </a:r>
-          </a:p>
-          <a:p>
-            <a:pPr>
-              <a:buFont typeface="Arial" panose="020B0604020202020204" pitchFamily="34" charset="0"/>
-              <a:buChar char="•"/>
-            </a:pPr>
-            <a:r>
-              <a:rPr lang="en-GB" sz="2800" dirty="0"/>
-              <a:t> Conclusions</a:t>
-            </a:r>
-          </a:p>
-          <a:p>
-            <a:endParaRPr lang="en-GB" dirty="0"/>
-          </a:p>
-        </p:txBody>
-      </p:sp>
-      <p:sp>
-        <p:nvSpPr>
-          <p:cNvPr id="7" name="Date Placeholder 6">
+              <a:rPr lang="en-GB" sz="3200" dirty="0"/>
+              <a:t> </a:t>
+            </a:r>
+            <a:r>
+              <a:rPr lang="en-GB" sz="3200" b="1" dirty="0"/>
+              <a:t>Entropically Driven </a:t>
+            </a:r>
+            <a:r>
+              <a:rPr lang="en-GB" sz="3200" dirty="0"/>
+              <a:t>– Occurring in the absence of attractive intermolecular forces</a:t>
+            </a:r>
+          </a:p>
+        </p:txBody>
+      </p:sp>
+      <p:sp>
+        <p:nvSpPr>
+          <p:cNvPr id="5" name="Date Placeholder 4">
             <a:extLst>
               <a:ext uri="{FF2B5EF4-FFF2-40B4-BE49-F238E27FC236}">
-                <a16:creationId xmlns:a16="http://schemas.microsoft.com/office/drawing/2014/main" id="{3C9CC48B-1CCE-412F-A1D4-0991F38FC073}"/>
+                <a16:creationId xmlns:a16="http://schemas.microsoft.com/office/drawing/2014/main" id="{5F4922A2-AF72-4771-BFB9-2C2889533C96}"/>
               </a:ext>
             </a:extLst>
           </p:cNvPr>
@@ -5059,7 +5983,7 @@
           <a:bodyPr/>
           <a:lstStyle/>
           <a:p>
-            <a:fld id="{339720CA-7F93-46E4-BD55-7C05EDF0D99C}" type="datetime1">
+            <a:fld id="{7158BEE1-24AC-45AA-AE5A-25B089A27E97}" type="datetime1">
               <a:rPr lang="en-GB" smtClean="0"/>
               <a:t>06/05/2021</a:t>
             </a:fld>
@@ -5069,10 +5993,10 @@
       </p:sp>
       <p:sp>
         <p:nvSpPr>
-          <p:cNvPr id="8" name="Footer Placeholder 7">
+          <p:cNvPr id="6" name="Footer Placeholder 5">
             <a:extLst>
               <a:ext uri="{FF2B5EF4-FFF2-40B4-BE49-F238E27FC236}">
-                <a16:creationId xmlns:a16="http://schemas.microsoft.com/office/drawing/2014/main" id="{D4FFF9EB-6A54-4C2A-B9B2-AE903E9D1386}"/>
+                <a16:creationId xmlns:a16="http://schemas.microsoft.com/office/drawing/2014/main" id="{2571D3AD-BE91-4885-AB7E-3E30D342FCBB}"/>
               </a:ext>
             </a:extLst>
           </p:cNvPr>
@@ -5097,10 +6021,10 @@
       </p:sp>
       <p:sp>
         <p:nvSpPr>
-          <p:cNvPr id="9" name="Slide Number Placeholder 8">
+          <p:cNvPr id="7" name="Slide Number Placeholder 6">
             <a:extLst>
               <a:ext uri="{FF2B5EF4-FFF2-40B4-BE49-F238E27FC236}">
-                <a16:creationId xmlns:a16="http://schemas.microsoft.com/office/drawing/2014/main" id="{B6C44EE6-121B-41BE-A574-497B1572AC93}"/>
+                <a16:creationId xmlns:a16="http://schemas.microsoft.com/office/drawing/2014/main" id="{63B1B88B-FDE6-4691-BA90-A614DE883E5B}"/>
               </a:ext>
             </a:extLst>
           </p:cNvPr>
@@ -5127,7 +6051,7 @@
     </p:spTree>
     <p:extLst>
       <p:ext uri="{BB962C8B-B14F-4D97-AF65-F5344CB8AC3E}">
-        <p14:creationId xmlns:p14="http://schemas.microsoft.com/office/powerpoint/2010/main" val="1634486955"/>
+        <p14:creationId xmlns:p14="http://schemas.microsoft.com/office/powerpoint/2010/main" val="2121459046"/>
       </p:ext>
     </p:extLst>
   </p:cSld>
@@ -5159,7 +6083,7 @@
           <p:cNvPr id="2" name="Title 1">
             <a:extLst>
               <a:ext uri="{FF2B5EF4-FFF2-40B4-BE49-F238E27FC236}">
-                <a16:creationId xmlns:a16="http://schemas.microsoft.com/office/drawing/2014/main" id="{8942B4A0-F150-405A-9068-8F7612F09AE0}"/>
+                <a16:creationId xmlns:a16="http://schemas.microsoft.com/office/drawing/2014/main" id="{A82EB67A-DA6F-4946-8E54-684D8B5F3A92}"/>
               </a:ext>
             </a:extLst>
           </p:cNvPr>
@@ -5177,17 +6101,644 @@
           <a:p>
             <a:r>
               <a:rPr lang="en-GB" dirty="0"/>
-              <a:t>Rigid Rod Simulations</a:t>
-            </a:r>
-          </a:p>
-        </p:txBody>
-      </p:sp>
-      <p:sp>
-        <p:nvSpPr>
-          <p:cNvPr id="3" name="Content Placeholder 2">
+              <a:t>Order Parameter</a:t>
+            </a:r>
+          </a:p>
+        </p:txBody>
+      </p:sp>
+      <mc:AlternateContent xmlns:mc="http://schemas.openxmlformats.org/markup-compatibility/2006">
+        <mc:Choice xmlns:a14="http://schemas.microsoft.com/office/drawing/2010/main" Requires="a14">
+          <p:sp>
+            <p:nvSpPr>
+              <p:cNvPr id="3" name="Content Placeholder 2">
+                <a:extLst>
+                  <a:ext uri="{FF2B5EF4-FFF2-40B4-BE49-F238E27FC236}">
+                    <a16:creationId xmlns:a16="http://schemas.microsoft.com/office/drawing/2014/main" id="{C85490A2-70BA-47A2-9EBF-5B93C3CDAE4D}"/>
+                  </a:ext>
+                </a:extLst>
+              </p:cNvPr>
+              <p:cNvSpPr>
+                <a:spLocks noGrp="1"/>
+              </p:cNvSpPr>
+              <p:nvPr>
+                <p:ph idx="1"/>
+              </p:nvPr>
+            </p:nvSpPr>
+            <p:spPr>
+              <a:xfrm>
+                <a:off x="1097279" y="1845734"/>
+                <a:ext cx="10701143" cy="4023360"/>
+              </a:xfrm>
+            </p:spPr>
+            <p:txBody>
+              <a:bodyPr>
+                <a:normAutofit/>
+              </a:bodyPr>
+              <a:lstStyle/>
+              <a:p>
+                <a:pPr marL="0" indent="0">
+                  <a:buNone/>
+                </a:pPr>
+                <a:endParaRPr lang="en-GB" dirty="0"/>
+              </a:p>
+              <a:p>
+                <a:pPr>
+                  <a:buFont typeface="Arial" panose="020B0604020202020204" pitchFamily="34" charset="0"/>
+                  <a:buChar char="•"/>
+                </a:pPr>
+                <a:r>
+                  <a:rPr lang="en-GB" dirty="0"/>
+                  <a:t> </a:t>
+                </a:r>
+                <a:r>
+                  <a:rPr lang="en-GB" b="1" dirty="0"/>
+                  <a:t>Nematic Order Parameter</a:t>
+                </a:r>
+                <a:r>
+                  <a:rPr lang="en-GB" dirty="0"/>
+                  <a:t>	</a:t>
+                </a:r>
+                <a14:m>
+                  <m:oMath xmlns:m="http://schemas.openxmlformats.org/officeDocument/2006/math">
+                    <m:sSub>
+                      <m:sSubPr>
+                        <m:ctrlPr>
+                          <a:rPr lang="en-GB" i="1" smtClean="0">
+                            <a:latin typeface="Cambria Math" panose="02040503050406030204" pitchFamily="18" charset="0"/>
+                          </a:rPr>
+                        </m:ctrlPr>
+                      </m:sSubPr>
+                      <m:e>
+                        <m:r>
+                          <a:rPr lang="en-GB" b="0" i="1" smtClean="0">
+                            <a:latin typeface="Cambria Math" panose="02040503050406030204" pitchFamily="18" charset="0"/>
+                          </a:rPr>
+                          <m:t>𝑆</m:t>
+                        </m:r>
+                      </m:e>
+                      <m:sub>
+                        <m:r>
+                          <a:rPr lang="en-GB" b="0" i="1" smtClean="0">
+                            <a:latin typeface="Cambria Math" panose="02040503050406030204" pitchFamily="18" charset="0"/>
+                          </a:rPr>
+                          <m:t>𝑛</m:t>
+                        </m:r>
+                      </m:sub>
+                    </m:sSub>
+                    <m:r>
+                      <a:rPr lang="en-GB" b="0" i="1" smtClean="0">
+                        <a:latin typeface="Cambria Math" panose="02040503050406030204" pitchFamily="18" charset="0"/>
+                      </a:rPr>
+                      <m:t>= </m:t>
+                    </m:r>
+                    <m:d>
+                      <m:dPr>
+                        <m:begChr m:val="⟨"/>
+                        <m:endChr m:val="⟩"/>
+                        <m:ctrlPr>
+                          <a:rPr lang="en-GB" b="0" i="1" smtClean="0">
+                            <a:latin typeface="Cambria Math" panose="02040503050406030204" pitchFamily="18" charset="0"/>
+                          </a:rPr>
+                        </m:ctrlPr>
+                      </m:dPr>
+                      <m:e>
+                        <m:sSub>
+                          <m:sSubPr>
+                            <m:ctrlPr>
+                              <a:rPr lang="en-GB" b="0" i="1" smtClean="0">
+                                <a:latin typeface="Cambria Math" panose="02040503050406030204" pitchFamily="18" charset="0"/>
+                              </a:rPr>
+                            </m:ctrlPr>
+                          </m:sSubPr>
+                          <m:e>
+                            <m:r>
+                              <a:rPr lang="en-GB" b="0" i="1" smtClean="0">
+                                <a:latin typeface="Cambria Math" panose="02040503050406030204" pitchFamily="18" charset="0"/>
+                              </a:rPr>
+                              <m:t>𝑃</m:t>
+                            </m:r>
+                          </m:e>
+                          <m:sub>
+                            <m:r>
+                              <a:rPr lang="en-GB" b="0" i="1" smtClean="0">
+                                <a:latin typeface="Cambria Math" panose="02040503050406030204" pitchFamily="18" charset="0"/>
+                              </a:rPr>
+                              <m:t>2</m:t>
+                            </m:r>
+                          </m:sub>
+                        </m:sSub>
+                        <m:d>
+                          <m:dPr>
+                            <m:ctrlPr>
+                              <a:rPr lang="en-GB" b="0" i="1" smtClean="0">
+                                <a:latin typeface="Cambria Math" panose="02040503050406030204" pitchFamily="18" charset="0"/>
+                              </a:rPr>
+                            </m:ctrlPr>
+                          </m:dPr>
+                          <m:e>
+                            <m:func>
+                              <m:funcPr>
+                                <m:ctrlPr>
+                                  <a:rPr lang="en-GB" b="0" i="1" smtClean="0">
+                                    <a:latin typeface="Cambria Math" panose="02040503050406030204" pitchFamily="18" charset="0"/>
+                                  </a:rPr>
+                                </m:ctrlPr>
+                              </m:funcPr>
+                              <m:fName>
+                                <m:r>
+                                  <m:rPr>
+                                    <m:sty m:val="p"/>
+                                  </m:rPr>
+                                  <a:rPr lang="en-GB" b="0" i="0" smtClean="0">
+                                    <a:latin typeface="Cambria Math" panose="02040503050406030204" pitchFamily="18" charset="0"/>
+                                  </a:rPr>
+                                  <m:t>cos</m:t>
+                                </m:r>
+                              </m:fName>
+                              <m:e>
+                                <m:r>
+                                  <a:rPr lang="en-GB" b="0" i="1" smtClean="0">
+                                    <a:latin typeface="Cambria Math" panose="02040503050406030204" pitchFamily="18" charset="0"/>
+                                    <a:ea typeface="Cambria Math" panose="02040503050406030204" pitchFamily="18" charset="0"/>
+                                  </a:rPr>
+                                  <m:t>𝜃</m:t>
+                                </m:r>
+                              </m:e>
+                            </m:func>
+                          </m:e>
+                        </m:d>
+                      </m:e>
+                    </m:d>
+                    <m:r>
+                      <a:rPr lang="en-GB" b="0" i="1" smtClean="0">
+                        <a:latin typeface="Cambria Math" panose="02040503050406030204" pitchFamily="18" charset="0"/>
+                      </a:rPr>
+                      <m:t> = </m:t>
+                    </m:r>
+                    <m:d>
+                      <m:dPr>
+                        <m:begChr m:val="⟨"/>
+                        <m:endChr m:val="⟩"/>
+                        <m:ctrlPr>
+                          <a:rPr lang="en-GB" b="0" i="1" smtClean="0">
+                            <a:latin typeface="Cambria Math" panose="02040503050406030204" pitchFamily="18" charset="0"/>
+                          </a:rPr>
+                        </m:ctrlPr>
+                      </m:dPr>
+                      <m:e>
+                        <m:r>
+                          <a:rPr lang="en-GB" b="0" i="1" smtClean="0">
+                            <a:latin typeface="Cambria Math" panose="02040503050406030204" pitchFamily="18" charset="0"/>
+                          </a:rPr>
+                          <m:t> </m:t>
+                        </m:r>
+                        <m:f>
+                          <m:fPr>
+                            <m:ctrlPr>
+                              <a:rPr lang="en-GB" b="0" i="1" smtClean="0">
+                                <a:latin typeface="Cambria Math" panose="02040503050406030204" pitchFamily="18" charset="0"/>
+                              </a:rPr>
+                            </m:ctrlPr>
+                          </m:fPr>
+                          <m:num>
+                            <m:r>
+                              <a:rPr lang="en-GB" b="0" i="1" smtClean="0">
+                                <a:latin typeface="Cambria Math" panose="02040503050406030204" pitchFamily="18" charset="0"/>
+                              </a:rPr>
+                              <m:t>3</m:t>
+                            </m:r>
+                          </m:num>
+                          <m:den>
+                            <m:r>
+                              <a:rPr lang="en-GB" b="0" i="1" smtClean="0">
+                                <a:latin typeface="Cambria Math" panose="02040503050406030204" pitchFamily="18" charset="0"/>
+                              </a:rPr>
+                              <m:t>2</m:t>
+                            </m:r>
+                          </m:den>
+                        </m:f>
+                        <m:func>
+                          <m:funcPr>
+                            <m:ctrlPr>
+                              <a:rPr lang="en-GB" b="0" i="1" smtClean="0">
+                                <a:latin typeface="Cambria Math" panose="02040503050406030204" pitchFamily="18" charset="0"/>
+                              </a:rPr>
+                            </m:ctrlPr>
+                          </m:funcPr>
+                          <m:fName>
+                            <m:sSup>
+                              <m:sSupPr>
+                                <m:ctrlPr>
+                                  <a:rPr lang="en-GB" b="0" i="1" smtClean="0">
+                                    <a:latin typeface="Cambria Math" panose="02040503050406030204" pitchFamily="18" charset="0"/>
+                                  </a:rPr>
+                                </m:ctrlPr>
+                              </m:sSupPr>
+                              <m:e>
+                                <m:r>
+                                  <m:rPr>
+                                    <m:sty m:val="p"/>
+                                  </m:rPr>
+                                  <a:rPr lang="en-GB" b="0" i="0" smtClean="0">
+                                    <a:latin typeface="Cambria Math" panose="02040503050406030204" pitchFamily="18" charset="0"/>
+                                  </a:rPr>
+                                  <m:t>cos</m:t>
+                                </m:r>
+                              </m:e>
+                              <m:sup>
+                                <m:r>
+                                  <a:rPr lang="en-GB" b="0" i="1" smtClean="0">
+                                    <a:latin typeface="Cambria Math" panose="02040503050406030204" pitchFamily="18" charset="0"/>
+                                  </a:rPr>
+                                  <m:t>2</m:t>
+                                </m:r>
+                              </m:sup>
+                            </m:sSup>
+                          </m:fName>
+                          <m:e>
+                            <m:d>
+                              <m:dPr>
+                                <m:ctrlPr>
+                                  <a:rPr lang="en-GB" b="0" i="1" smtClean="0">
+                                    <a:latin typeface="Cambria Math" panose="02040503050406030204" pitchFamily="18" charset="0"/>
+                                  </a:rPr>
+                                </m:ctrlPr>
+                              </m:dPr>
+                              <m:e>
+                                <m:r>
+                                  <a:rPr lang="en-GB" b="0" i="1" smtClean="0">
+                                    <a:latin typeface="Cambria Math" panose="02040503050406030204" pitchFamily="18" charset="0"/>
+                                    <a:ea typeface="Cambria Math" panose="02040503050406030204" pitchFamily="18" charset="0"/>
+                                  </a:rPr>
+                                  <m:t>𝜃</m:t>
+                                </m:r>
+                              </m:e>
+                            </m:d>
+                            <m:r>
+                              <a:rPr lang="en-GB" b="0" i="1" smtClean="0">
+                                <a:latin typeface="Cambria Math" panose="02040503050406030204" pitchFamily="18" charset="0"/>
+                              </a:rPr>
+                              <m:t>−</m:t>
+                            </m:r>
+                            <m:f>
+                              <m:fPr>
+                                <m:ctrlPr>
+                                  <a:rPr lang="en-GB" b="0" i="1" smtClean="0">
+                                    <a:latin typeface="Cambria Math" panose="02040503050406030204" pitchFamily="18" charset="0"/>
+                                  </a:rPr>
+                                </m:ctrlPr>
+                              </m:fPr>
+                              <m:num>
+                                <m:r>
+                                  <a:rPr lang="en-GB" b="0" i="1" smtClean="0">
+                                    <a:latin typeface="Cambria Math" panose="02040503050406030204" pitchFamily="18" charset="0"/>
+                                  </a:rPr>
+                                  <m:t>1</m:t>
+                                </m:r>
+                              </m:num>
+                              <m:den>
+                                <m:r>
+                                  <a:rPr lang="en-GB" b="0" i="1" smtClean="0">
+                                    <a:latin typeface="Cambria Math" panose="02040503050406030204" pitchFamily="18" charset="0"/>
+                                  </a:rPr>
+                                  <m:t>2</m:t>
+                                </m:r>
+                              </m:den>
+                            </m:f>
+                          </m:e>
+                        </m:func>
+                        <m:r>
+                          <a:rPr lang="en-GB" b="0" i="1" smtClean="0">
+                            <a:latin typeface="Cambria Math" panose="02040503050406030204" pitchFamily="18" charset="0"/>
+                          </a:rPr>
+                          <m:t> </m:t>
+                        </m:r>
+                      </m:e>
+                    </m:d>
+                    <m:r>
+                      <a:rPr lang="en-GB" b="0" i="1" smtClean="0">
+                        <a:latin typeface="Cambria Math" panose="02040503050406030204" pitchFamily="18" charset="0"/>
+                      </a:rPr>
+                      <m:t> </m:t>
+                    </m:r>
+                  </m:oMath>
+                </a14:m>
+                <a:endParaRPr lang="en-GB" dirty="0"/>
+              </a:p>
+              <a:p>
+                <a:pPr marL="0" indent="0">
+                  <a:buNone/>
+                </a:pPr>
+                <a:endParaRPr lang="en-GB" dirty="0"/>
+              </a:p>
+              <a:p>
+                <a:pPr>
+                  <a:buFont typeface="Arial" panose="020B0604020202020204" pitchFamily="34" charset="0"/>
+                  <a:buChar char="•"/>
+                </a:pPr>
+                <a:r>
+                  <a:rPr lang="en-GB" dirty="0"/>
+                  <a:t> </a:t>
+                </a:r>
+                <a:r>
+                  <a:rPr lang="en-GB" b="1" dirty="0"/>
+                  <a:t>Smectic Order Parameter</a:t>
+                </a:r>
+                <a:r>
+                  <a:rPr lang="en-GB" dirty="0"/>
+                  <a:t>	</a:t>
+                </a:r>
+                <a14:m>
+                  <m:oMath xmlns:m="http://schemas.openxmlformats.org/officeDocument/2006/math">
+                    <m:sSub>
+                      <m:sSubPr>
+                        <m:ctrlPr>
+                          <a:rPr lang="en-GB" i="1" smtClean="0">
+                            <a:latin typeface="Cambria Math" panose="02040503050406030204" pitchFamily="18" charset="0"/>
+                          </a:rPr>
+                        </m:ctrlPr>
+                      </m:sSubPr>
+                      <m:e>
+                        <m:r>
+                          <a:rPr lang="en-GB" b="0" i="1" smtClean="0">
+                            <a:latin typeface="Cambria Math" panose="02040503050406030204" pitchFamily="18" charset="0"/>
+                          </a:rPr>
+                          <m:t>𝑆</m:t>
+                        </m:r>
+                      </m:e>
+                      <m:sub>
+                        <m:r>
+                          <a:rPr lang="en-GB" b="0" i="1" smtClean="0">
+                            <a:latin typeface="Cambria Math" panose="02040503050406030204" pitchFamily="18" charset="0"/>
+                          </a:rPr>
+                          <m:t>𝑠</m:t>
+                        </m:r>
+                      </m:sub>
+                    </m:sSub>
+                    <m:r>
+                      <a:rPr lang="en-GB" b="0" i="1" smtClean="0">
+                        <a:latin typeface="Cambria Math" panose="02040503050406030204" pitchFamily="18" charset="0"/>
+                      </a:rPr>
+                      <m:t>= </m:t>
+                    </m:r>
+                    <m:f>
+                      <m:fPr>
+                        <m:ctrlPr>
+                          <a:rPr lang="en-GB" b="0" i="1" smtClean="0">
+                            <a:latin typeface="Cambria Math" panose="02040503050406030204" pitchFamily="18" charset="0"/>
+                          </a:rPr>
+                        </m:ctrlPr>
+                      </m:fPr>
+                      <m:num>
+                        <m:r>
+                          <a:rPr lang="en-GB" b="0" i="1" smtClean="0">
+                            <a:latin typeface="Cambria Math" panose="02040503050406030204" pitchFamily="18" charset="0"/>
+                          </a:rPr>
+                          <m:t>1</m:t>
+                        </m:r>
+                      </m:num>
+                      <m:den>
+                        <m:r>
+                          <a:rPr lang="en-GB" b="0" i="1" smtClean="0">
+                            <a:latin typeface="Cambria Math" panose="02040503050406030204" pitchFamily="18" charset="0"/>
+                          </a:rPr>
+                          <m:t>𝑁</m:t>
+                        </m:r>
+                      </m:den>
+                    </m:f>
+                    <m:d>
+                      <m:dPr>
+                        <m:begChr m:val="|"/>
+                        <m:endChr m:val="|"/>
+                        <m:ctrlPr>
+                          <a:rPr lang="en-GB" b="0" i="1" smtClean="0">
+                            <a:latin typeface="Cambria Math" panose="02040503050406030204" pitchFamily="18" charset="0"/>
+                          </a:rPr>
+                        </m:ctrlPr>
+                      </m:dPr>
+                      <m:e>
+                        <m:nary>
+                          <m:naryPr>
+                            <m:chr m:val="∑"/>
+                            <m:ctrlPr>
+                              <a:rPr lang="en-GB" b="0" i="1" smtClean="0">
+                                <a:latin typeface="Cambria Math" panose="02040503050406030204" pitchFamily="18" charset="0"/>
+                              </a:rPr>
+                            </m:ctrlPr>
+                          </m:naryPr>
+                          <m:sub>
+                            <m:r>
+                              <m:rPr>
+                                <m:brk m:alnAt="23"/>
+                              </m:rPr>
+                              <a:rPr lang="en-GB" b="0" i="1" smtClean="0">
+                                <a:latin typeface="Cambria Math" panose="02040503050406030204" pitchFamily="18" charset="0"/>
+                              </a:rPr>
+                              <m:t>𝑗</m:t>
+                            </m:r>
+                            <m:r>
+                              <a:rPr lang="en-GB" b="0" i="1" smtClean="0">
+                                <a:latin typeface="Cambria Math" panose="02040503050406030204" pitchFamily="18" charset="0"/>
+                              </a:rPr>
+                              <m:t>=0</m:t>
+                            </m:r>
+                          </m:sub>
+                          <m:sup>
+                            <m:r>
+                              <a:rPr lang="en-GB" b="0" i="1" smtClean="0">
+                                <a:latin typeface="Cambria Math" panose="02040503050406030204" pitchFamily="18" charset="0"/>
+                              </a:rPr>
+                              <m:t>𝑁</m:t>
+                            </m:r>
+                          </m:sup>
+                          <m:e>
+                            <m:sSup>
+                              <m:sSupPr>
+                                <m:ctrlPr>
+                                  <a:rPr lang="en-GB" b="0" i="1" smtClean="0">
+                                    <a:latin typeface="Cambria Math" panose="02040503050406030204" pitchFamily="18" charset="0"/>
+                                  </a:rPr>
+                                </m:ctrlPr>
+                              </m:sSupPr>
+                              <m:e>
+                                <m:r>
+                                  <a:rPr lang="en-GB" b="0" i="1" smtClean="0">
+                                    <a:latin typeface="Cambria Math" panose="02040503050406030204" pitchFamily="18" charset="0"/>
+                                  </a:rPr>
+                                  <m:t>𝑒</m:t>
+                                </m:r>
+                              </m:e>
+                              <m:sup>
+                                <m:f>
+                                  <m:fPr>
+                                    <m:ctrlPr>
+                                      <a:rPr lang="en-GB" b="0" i="1" smtClean="0">
+                                        <a:latin typeface="Cambria Math" panose="02040503050406030204" pitchFamily="18" charset="0"/>
+                                      </a:rPr>
+                                    </m:ctrlPr>
+                                  </m:fPr>
+                                  <m:num>
+                                    <m:r>
+                                      <a:rPr lang="en-GB" b="0" i="1" smtClean="0">
+                                        <a:latin typeface="Cambria Math" panose="02040503050406030204" pitchFamily="18" charset="0"/>
+                                      </a:rPr>
+                                      <m:t>2</m:t>
+                                    </m:r>
+                                    <m:r>
+                                      <a:rPr lang="en-GB" b="0" i="1" smtClean="0">
+                                        <a:latin typeface="Cambria Math" panose="02040503050406030204" pitchFamily="18" charset="0"/>
+                                        <a:ea typeface="Cambria Math" panose="02040503050406030204" pitchFamily="18" charset="0"/>
+                                      </a:rPr>
+                                      <m:t>𝜋</m:t>
+                                    </m:r>
+                                  </m:num>
+                                  <m:den>
+                                    <m:r>
+                                      <a:rPr lang="en-GB" b="0" i="1" smtClean="0">
+                                        <a:latin typeface="Cambria Math" panose="02040503050406030204" pitchFamily="18" charset="0"/>
+                                      </a:rPr>
+                                      <m:t>𝐿</m:t>
+                                    </m:r>
+                                  </m:den>
+                                </m:f>
+                                <m:r>
+                                  <a:rPr lang="en-GB" b="0" i="1" smtClean="0">
+                                    <a:latin typeface="Cambria Math" panose="02040503050406030204" pitchFamily="18" charset="0"/>
+                                  </a:rPr>
+                                  <m:t>𝑖</m:t>
+                                </m:r>
+                                <m:sSub>
+                                  <m:sSubPr>
+                                    <m:ctrlPr>
+                                      <a:rPr lang="en-GB" b="0" i="1" smtClean="0">
+                                        <a:latin typeface="Cambria Math" panose="02040503050406030204" pitchFamily="18" charset="0"/>
+                                      </a:rPr>
+                                    </m:ctrlPr>
+                                  </m:sSubPr>
+                                  <m:e>
+                                    <m:r>
+                                      <a:rPr lang="en-GB" b="1" i="1" smtClean="0">
+                                        <a:latin typeface="Cambria Math" panose="02040503050406030204" pitchFamily="18" charset="0"/>
+                                      </a:rPr>
+                                      <m:t>𝒓</m:t>
+                                    </m:r>
+                                  </m:e>
+                                  <m:sub>
+                                    <m:r>
+                                      <a:rPr lang="en-GB" b="0" i="1" smtClean="0">
+                                        <a:latin typeface="Cambria Math" panose="02040503050406030204" pitchFamily="18" charset="0"/>
+                                      </a:rPr>
+                                      <m:t>𝑗</m:t>
+                                    </m:r>
+                                  </m:sub>
+                                </m:sSub>
+                                <m:r>
+                                  <a:rPr lang="en-GB" b="0" i="1" smtClean="0">
+                                    <a:latin typeface="Cambria Math" panose="02040503050406030204" pitchFamily="18" charset="0"/>
+                                    <a:ea typeface="Cambria Math" panose="02040503050406030204" pitchFamily="18" charset="0"/>
+                                  </a:rPr>
+                                  <m:t>∙</m:t>
+                                </m:r>
+                                <m:acc>
+                                  <m:accPr>
+                                    <m:chr m:val="̂"/>
+                                    <m:ctrlPr>
+                                      <a:rPr lang="en-GB" b="0" i="1" smtClean="0">
+                                        <a:latin typeface="Cambria Math" panose="02040503050406030204" pitchFamily="18" charset="0"/>
+                                        <a:ea typeface="Cambria Math" panose="02040503050406030204" pitchFamily="18" charset="0"/>
+                                      </a:rPr>
+                                    </m:ctrlPr>
+                                  </m:accPr>
+                                  <m:e>
+                                    <m:r>
+                                      <a:rPr lang="en-GB" b="1" i="1" smtClean="0">
+                                        <a:latin typeface="Cambria Math" panose="02040503050406030204" pitchFamily="18" charset="0"/>
+                                        <a:ea typeface="Cambria Math" panose="02040503050406030204" pitchFamily="18" charset="0"/>
+                                      </a:rPr>
+                                      <m:t>𝒏</m:t>
+                                    </m:r>
+                                  </m:e>
+                                </m:acc>
+                              </m:sup>
+                            </m:sSup>
+                          </m:e>
+                        </m:nary>
+                      </m:e>
+                    </m:d>
+                  </m:oMath>
+                </a14:m>
+                <a:endParaRPr lang="en-GB" dirty="0"/>
+              </a:p>
+              <a:p>
+                <a:pPr>
+                  <a:buFont typeface="Arial" panose="020B0604020202020204" pitchFamily="34" charset="0"/>
+                  <a:buChar char="•"/>
+                </a:pPr>
+                <a:endParaRPr lang="en-GB" dirty="0"/>
+              </a:p>
+              <a:p>
+                <a:pPr>
+                  <a:buFont typeface="Arial" panose="020B0604020202020204" pitchFamily="34" charset="0"/>
+                  <a:buChar char="•"/>
+                </a:pPr>
+                <a:r>
+                  <a:rPr lang="en-GB" i="1" dirty="0"/>
+                  <a:t> Both range from 1 (perfectly ordered) to 0 (no order)</a:t>
+                </a:r>
+              </a:p>
+            </p:txBody>
+          </p:sp>
+        </mc:Choice>
+        <mc:Fallback>
+          <p:sp>
+            <p:nvSpPr>
+              <p:cNvPr id="3" name="Content Placeholder 2">
+                <a:extLst>
+                  <a:ext uri="{FF2B5EF4-FFF2-40B4-BE49-F238E27FC236}">
+                    <a16:creationId xmlns:a16="http://schemas.microsoft.com/office/drawing/2014/main" id="{C85490A2-70BA-47A2-9EBF-5B93C3CDAE4D}"/>
+                  </a:ext>
+                </a:extLst>
+              </p:cNvPr>
+              <p:cNvSpPr>
+                <a:spLocks noGrp="1" noRot="1" noChangeAspect="1" noMove="1" noResize="1" noEditPoints="1" noAdjustHandles="1" noChangeArrowheads="1" noChangeShapeType="1" noTextEdit="1"/>
+              </p:cNvSpPr>
+              <p:nvPr>
+                <p:ph idx="1"/>
+              </p:nvPr>
+            </p:nvSpPr>
+            <p:spPr>
+              <a:xfrm>
+                <a:off x="1097279" y="1845734"/>
+                <a:ext cx="10701143" cy="4023360"/>
+              </a:xfrm>
+              <a:blipFill>
+                <a:blip r:embed="rId2"/>
+                <a:stretch>
+                  <a:fillRect l="-1880" b="-455"/>
+                </a:stretch>
+              </a:blipFill>
+            </p:spPr>
+            <p:txBody>
+              <a:bodyPr/>
+              <a:lstStyle/>
+              <a:p>
+                <a:r>
+                  <a:rPr lang="en-GB">
+                    <a:noFill/>
+                  </a:rPr>
+                  <a:t> </a:t>
+                </a:r>
+              </a:p>
+            </p:txBody>
+          </p:sp>
+        </mc:Fallback>
+      </mc:AlternateContent>
+      <p:sp>
+        <p:nvSpPr>
+          <p:cNvPr id="4" name="Date Placeholder 3">
             <a:extLst>
               <a:ext uri="{FF2B5EF4-FFF2-40B4-BE49-F238E27FC236}">
-                <a16:creationId xmlns:a16="http://schemas.microsoft.com/office/drawing/2014/main" id="{AC53D448-2676-4126-B047-DB0C6E8D4412}"/>
+                <a16:creationId xmlns:a16="http://schemas.microsoft.com/office/drawing/2014/main" id="{D15BD117-7EDE-4B78-B756-92D3AB936C3F}"/>
               </a:ext>
             </a:extLst>
           </p:cNvPr>
@@ -5195,111 +6746,6 @@
             <a:spLocks noGrp="1"/>
           </p:cNvSpPr>
           <p:nvPr>
-            <p:ph idx="1"/>
-          </p:nvPr>
-        </p:nvSpPr>
-        <p:spPr/>
-        <p:txBody>
-          <a:bodyPr>
-            <a:normAutofit/>
-          </a:bodyPr>
-          <a:lstStyle/>
-          <a:p>
-            <a:pPr>
-              <a:buFont typeface="Arial" panose="020B0604020202020204" pitchFamily="34" charset="0"/>
-              <a:buChar char="•"/>
-            </a:pPr>
-            <a:r>
-              <a:rPr lang="en-GB" sz="2800" dirty="0"/>
-              <a:t> Introduction</a:t>
-            </a:r>
-          </a:p>
-          <a:p>
-            <a:pPr>
-              <a:buFont typeface="Arial" panose="020B0604020202020204" pitchFamily="34" charset="0"/>
-              <a:buChar char="•"/>
-            </a:pPr>
-            <a:r>
-              <a:rPr lang="en-GB" sz="2800" b="1" dirty="0"/>
-              <a:t> </a:t>
-            </a:r>
-            <a:r>
-              <a:rPr lang="en-GB" sz="2800" dirty="0"/>
-              <a:t>Methods</a:t>
-            </a:r>
-          </a:p>
-          <a:p>
-            <a:pPr>
-              <a:buFont typeface="Arial" panose="020B0604020202020204" pitchFamily="34" charset="0"/>
-              <a:buChar char="•"/>
-            </a:pPr>
-            <a:r>
-              <a:rPr lang="en-GB" sz="2800" dirty="0"/>
-              <a:t> </a:t>
-            </a:r>
-            <a:r>
-              <a:rPr lang="en-GB" sz="2800" b="1" dirty="0"/>
-              <a:t>Rigid Rod Simulations</a:t>
-            </a:r>
-          </a:p>
-          <a:p>
-            <a:pPr lvl="1">
-              <a:buFont typeface="Arial" panose="020B0604020202020204" pitchFamily="34" charset="0"/>
-              <a:buChar char="•"/>
-            </a:pPr>
-            <a:r>
-              <a:rPr lang="en-GB" sz="2400" i="1" dirty="0"/>
-              <a:t>Nematic Transition</a:t>
-            </a:r>
-          </a:p>
-          <a:p>
-            <a:pPr lvl="1">
-              <a:buFont typeface="Arial" panose="020B0604020202020204" pitchFamily="34" charset="0"/>
-              <a:buChar char="•"/>
-            </a:pPr>
-            <a:r>
-              <a:rPr lang="en-GB" sz="2400" i="1" dirty="0"/>
-              <a:t>Smectic Transition</a:t>
-            </a:r>
-          </a:p>
-          <a:p>
-            <a:pPr>
-              <a:buFont typeface="Arial" panose="020B0604020202020204" pitchFamily="34" charset="0"/>
-              <a:buChar char="•"/>
-            </a:pPr>
-            <a:r>
-              <a:rPr lang="en-GB" sz="2800" dirty="0"/>
-              <a:t> Nunchuck Simulations </a:t>
-            </a:r>
-          </a:p>
-          <a:p>
-            <a:pPr>
-              <a:buFont typeface="Arial" panose="020B0604020202020204" pitchFamily="34" charset="0"/>
-              <a:buChar char="•"/>
-            </a:pPr>
-            <a:r>
-              <a:rPr lang="en-GB" sz="2800" dirty="0"/>
-              <a:t> Conclusions</a:t>
-            </a:r>
-          </a:p>
-          <a:p>
-            <a:endParaRPr lang="en-GB" dirty="0"/>
-          </a:p>
-        </p:txBody>
-      </p:sp>
-      <p:sp>
-        <p:nvSpPr>
-          <p:cNvPr id="7" name="Date Placeholder 6">
-            <a:extLst>
-              <a:ext uri="{FF2B5EF4-FFF2-40B4-BE49-F238E27FC236}">
-                <a16:creationId xmlns:a16="http://schemas.microsoft.com/office/drawing/2014/main" id="{C3EC29A1-3F1F-4672-BD61-9D8F6A796CD5}"/>
-              </a:ext>
-            </a:extLst>
-          </p:cNvPr>
-          <p:cNvSpPr>
-            <a:spLocks noGrp="1"/>
-          </p:cNvSpPr>
-          <p:nvPr>
             <p:ph type="dt" sz="half" idx="10"/>
           </p:nvPr>
         </p:nvSpPr>
@@ -5308,7 +6754,7 @@
           <a:bodyPr/>
           <a:lstStyle/>
           <a:p>
-            <a:fld id="{5ED3C242-668A-4C09-B0F2-37AF4FC7BCE8}" type="datetime1">
+            <a:fld id="{7F253374-1CF5-427D-922B-09BFB2E7CA63}" type="datetime1">
               <a:rPr lang="en-GB" smtClean="0"/>
               <a:t>06/05/2021</a:t>
             </a:fld>
@@ -5318,10 +6764,10 @@
       </p:sp>
       <p:sp>
         <p:nvSpPr>
-          <p:cNvPr id="8" name="Footer Placeholder 7">
+          <p:cNvPr id="5" name="Footer Placeholder 4">
             <a:extLst>
               <a:ext uri="{FF2B5EF4-FFF2-40B4-BE49-F238E27FC236}">
-                <a16:creationId xmlns:a16="http://schemas.microsoft.com/office/drawing/2014/main" id="{53B70617-410A-4AB2-8AD5-DDE0CED9C1F5}"/>
+                <a16:creationId xmlns:a16="http://schemas.microsoft.com/office/drawing/2014/main" id="{920C26E9-E106-456F-81BF-FC0C56C37C6D}"/>
               </a:ext>
             </a:extLst>
           </p:cNvPr>
@@ -5346,10 +6792,10 @@
       </p:sp>
       <p:sp>
         <p:nvSpPr>
-          <p:cNvPr id="9" name="Slide Number Placeholder 8">
+          <p:cNvPr id="6" name="Slide Number Placeholder 5">
             <a:extLst>
               <a:ext uri="{FF2B5EF4-FFF2-40B4-BE49-F238E27FC236}">
-                <a16:creationId xmlns:a16="http://schemas.microsoft.com/office/drawing/2014/main" id="{837BB13C-55C4-4CAF-96F7-29F3B0A46D5D}"/>
+                <a16:creationId xmlns:a16="http://schemas.microsoft.com/office/drawing/2014/main" id="{B2DC3A50-B463-4E62-8239-9A0E243F74D6}"/>
               </a:ext>
             </a:extLst>
           </p:cNvPr>
@@ -5376,7 +6822,7 @@
     </p:spTree>
     <p:extLst>
       <p:ext uri="{BB962C8B-B14F-4D97-AF65-F5344CB8AC3E}">
-        <p14:creationId xmlns:p14="http://schemas.microsoft.com/office/powerpoint/2010/main" val="2442228963"/>
+        <p14:creationId xmlns:p14="http://schemas.microsoft.com/office/powerpoint/2010/main" val="423235810"/>
       </p:ext>
     </p:extLst>
   </p:cSld>
@@ -5408,7 +6854,7 @@
           <p:cNvPr id="2" name="Title 1">
             <a:extLst>
               <a:ext uri="{FF2B5EF4-FFF2-40B4-BE49-F238E27FC236}">
-                <a16:creationId xmlns:a16="http://schemas.microsoft.com/office/drawing/2014/main" id="{8942B4A0-F150-405A-9068-8F7612F09AE0}"/>
+                <a16:creationId xmlns:a16="http://schemas.microsoft.com/office/drawing/2014/main" id="{92B565AD-5E36-4446-AA4B-FDDD7A4B1B72}"/>
               </a:ext>
             </a:extLst>
           </p:cNvPr>
@@ -5425,10 +6871,9 @@
           <a:lstStyle/>
           <a:p>
             <a:r>
-              <a:rPr lang="en-GB" sz="4800" dirty="0"/>
-              <a:t>Nunchuck Simulations</a:t>
-            </a:r>
-            <a:endParaRPr lang="en-GB" dirty="0"/>
+              <a:rPr lang="en-GB" dirty="0"/>
+              <a:t>DNA as a Liquid Crystal</a:t>
+            </a:r>
           </a:p>
         </p:txBody>
       </p:sp>
@@ -5437,7 +6882,7 @@
           <p:cNvPr id="3" name="Content Placeholder 2">
             <a:extLst>
               <a:ext uri="{FF2B5EF4-FFF2-40B4-BE49-F238E27FC236}">
-                <a16:creationId xmlns:a16="http://schemas.microsoft.com/office/drawing/2014/main" id="{AC53D448-2676-4126-B047-DB0C6E8D4412}"/>
+                <a16:creationId xmlns:a16="http://schemas.microsoft.com/office/drawing/2014/main" id="{D2CED2D2-B4AD-44C1-933A-E3F1DC2807B4}"/>
               </a:ext>
             </a:extLst>
           </p:cNvPr>
@@ -5450,109 +6895,19 @@
         </p:nvSpPr>
         <p:spPr/>
         <p:txBody>
-          <a:bodyPr>
-            <a:normAutofit/>
-          </a:bodyPr>
-          <a:lstStyle/>
-          <a:p>
-            <a:pPr>
-              <a:buFont typeface="Arial" panose="020B0604020202020204" pitchFamily="34" charset="0"/>
-              <a:buChar char="•"/>
-            </a:pPr>
-            <a:r>
-              <a:rPr lang="en-GB" sz="2800" dirty="0"/>
-              <a:t> Introduction</a:t>
-            </a:r>
-          </a:p>
-          <a:p>
-            <a:pPr>
-              <a:buFont typeface="Arial" panose="020B0604020202020204" pitchFamily="34" charset="0"/>
-              <a:buChar char="•"/>
-            </a:pPr>
-            <a:r>
-              <a:rPr lang="en-GB" sz="2800" b="1" dirty="0"/>
-              <a:t> </a:t>
-            </a:r>
-            <a:r>
-              <a:rPr lang="en-GB" sz="2800" dirty="0"/>
-              <a:t>Methods</a:t>
-            </a:r>
-          </a:p>
-          <a:p>
-            <a:pPr>
-              <a:buFont typeface="Arial" panose="020B0604020202020204" pitchFamily="34" charset="0"/>
-              <a:buChar char="•"/>
-            </a:pPr>
-            <a:r>
-              <a:rPr lang="en-GB" sz="2800" dirty="0"/>
-              <a:t> Rigid Rod Simulations</a:t>
-            </a:r>
-          </a:p>
-          <a:p>
-            <a:pPr>
-              <a:buFont typeface="Arial" panose="020B0604020202020204" pitchFamily="34" charset="0"/>
-              <a:buChar char="•"/>
-            </a:pPr>
-            <a:r>
-              <a:rPr lang="en-GB" sz="2800" dirty="0"/>
-              <a:t> </a:t>
-            </a:r>
-            <a:r>
-              <a:rPr lang="en-GB" sz="2800" b="1" dirty="0"/>
-              <a:t>Nunchuck Simulations </a:t>
-            </a:r>
-          </a:p>
-          <a:p>
-            <a:pPr lvl="1">
-              <a:buFont typeface="Arial" panose="020B0604020202020204" pitchFamily="34" charset="0"/>
-              <a:buChar char="•"/>
-            </a:pPr>
-            <a:r>
-              <a:rPr lang="en-GB" sz="2400" i="1" dirty="0"/>
-              <a:t>Fixed Rigidity</a:t>
-            </a:r>
-          </a:p>
-          <a:p>
-            <a:pPr lvl="1">
-              <a:buFont typeface="Arial" panose="020B0604020202020204" pitchFamily="34" charset="0"/>
-              <a:buChar char="•"/>
-            </a:pPr>
-            <a:r>
-              <a:rPr lang="en-GB" sz="2400" i="1" dirty="0"/>
-              <a:t>Fixed Angle</a:t>
-            </a:r>
-          </a:p>
-          <a:p>
-            <a:pPr lvl="1">
-              <a:buFont typeface="Arial" panose="020B0604020202020204" pitchFamily="34" charset="0"/>
-              <a:buChar char="•"/>
-            </a:pPr>
-            <a:r>
-              <a:rPr lang="en-GB" sz="2400" i="1" dirty="0"/>
-              <a:t>Dynamic Properties</a:t>
-            </a:r>
-          </a:p>
-          <a:p>
-            <a:pPr>
-              <a:buFont typeface="Arial" panose="020B0604020202020204" pitchFamily="34" charset="0"/>
-              <a:buChar char="•"/>
-            </a:pPr>
-            <a:r>
-              <a:rPr lang="en-GB" sz="2800" dirty="0"/>
-              <a:t> Conclusions</a:t>
-            </a:r>
-          </a:p>
-          <a:p>
-            <a:endParaRPr lang="en-GB" dirty="0"/>
-          </a:p>
-        </p:txBody>
-      </p:sp>
-      <p:sp>
-        <p:nvSpPr>
-          <p:cNvPr id="7" name="Date Placeholder 6">
+          <a:bodyPr/>
+          <a:lstStyle/>
+          <a:p>
+            <a:endParaRPr lang="en-GB"/>
+          </a:p>
+        </p:txBody>
+      </p:sp>
+      <p:sp>
+        <p:nvSpPr>
+          <p:cNvPr id="4" name="Date Placeholder 3">
             <a:extLst>
               <a:ext uri="{FF2B5EF4-FFF2-40B4-BE49-F238E27FC236}">
-                <a16:creationId xmlns:a16="http://schemas.microsoft.com/office/drawing/2014/main" id="{F8D3FD9E-0468-4D84-B8AB-62CFA79681D8}"/>
+                <a16:creationId xmlns:a16="http://schemas.microsoft.com/office/drawing/2014/main" id="{B32004A2-F3EB-4815-B3B9-701956162A12}"/>
               </a:ext>
             </a:extLst>
           </p:cNvPr>
@@ -5568,7 +6923,7 @@
           <a:bodyPr/>
           <a:lstStyle/>
           <a:p>
-            <a:fld id="{71A55007-BF49-4C86-8F7D-090310C8A7F3}" type="datetime1">
+            <a:fld id="{7F253374-1CF5-427D-922B-09BFB2E7CA63}" type="datetime1">
               <a:rPr lang="en-GB" smtClean="0"/>
               <a:t>06/05/2021</a:t>
             </a:fld>
@@ -5578,10 +6933,10 @@
       </p:sp>
       <p:sp>
         <p:nvSpPr>
-          <p:cNvPr id="8" name="Footer Placeholder 7">
+          <p:cNvPr id="5" name="Footer Placeholder 4">
             <a:extLst>
               <a:ext uri="{FF2B5EF4-FFF2-40B4-BE49-F238E27FC236}">
-                <a16:creationId xmlns:a16="http://schemas.microsoft.com/office/drawing/2014/main" id="{189657EC-EC9C-4C75-A24A-09DBF3570A54}"/>
+                <a16:creationId xmlns:a16="http://schemas.microsoft.com/office/drawing/2014/main" id="{8FA9E69C-9F06-416F-8313-D692723FF020}"/>
               </a:ext>
             </a:extLst>
           </p:cNvPr>
@@ -5606,10 +6961,10 @@
       </p:sp>
       <p:sp>
         <p:nvSpPr>
-          <p:cNvPr id="9" name="Slide Number Placeholder 8">
+          <p:cNvPr id="6" name="Slide Number Placeholder 5">
             <a:extLst>
               <a:ext uri="{FF2B5EF4-FFF2-40B4-BE49-F238E27FC236}">
-                <a16:creationId xmlns:a16="http://schemas.microsoft.com/office/drawing/2014/main" id="{8816638D-F0BD-468E-97B8-12C8EF9A6909}"/>
+                <a16:creationId xmlns:a16="http://schemas.microsoft.com/office/drawing/2014/main" id="{A06C618F-D456-4CE5-9040-4B32DEAC4193}"/>
               </a:ext>
             </a:extLst>
           </p:cNvPr>
@@ -5636,7 +6991,7 @@
     </p:spTree>
     <p:extLst>
       <p:ext uri="{BB962C8B-B14F-4D97-AF65-F5344CB8AC3E}">
-        <p14:creationId xmlns:p14="http://schemas.microsoft.com/office/powerpoint/2010/main" val="2301142952"/>
+        <p14:creationId xmlns:p14="http://schemas.microsoft.com/office/powerpoint/2010/main" val="1359185175"/>
       </p:ext>
     </p:extLst>
   </p:cSld>
@@ -5686,7 +7041,7 @@
           <a:p>
             <a:r>
               <a:rPr lang="en-GB" dirty="0"/>
-              <a:t>Introduction</a:t>
+              <a:t>Methods</a:t>
             </a:r>
           </a:p>
         </p:txBody>
@@ -5730,11 +7085,27 @@
             </a:pPr>
             <a:r>
               <a:rPr lang="en-GB" sz="2800" b="1" dirty="0"/>
-              <a:t> </a:t>
-            </a:r>
-            <a:r>
-              <a:rPr lang="en-GB" sz="2800" dirty="0"/>
-              <a:t>Methods</a:t>
+              <a:t> Methods</a:t>
+            </a:r>
+          </a:p>
+          <a:p>
+            <a:pPr lvl="1">
+              <a:buFont typeface="Arial" panose="020B0604020202020204" pitchFamily="34" charset="0"/>
+              <a:buChar char="•"/>
+            </a:pPr>
+            <a:r>
+              <a:rPr lang="en-GB" sz="2400" i="1" dirty="0"/>
+              <a:t>LAMMPS Software</a:t>
+            </a:r>
+          </a:p>
+          <a:p>
+            <a:pPr lvl="1">
+              <a:buFont typeface="Arial" panose="020B0604020202020204" pitchFamily="34" charset="0"/>
+              <a:buChar char="•"/>
+            </a:pPr>
+            <a:r>
+              <a:rPr lang="en-GB" sz="2400" i="1" dirty="0"/>
+              <a:t>Nunchuck Molecules</a:t>
             </a:r>
           </a:p>
           <a:p>
@@ -5764,33 +7135,8 @@
             </a:pPr>
             <a:r>
               <a:rPr lang="en-GB" sz="2800" dirty="0"/>
-              <a:t> </a:t>
-            </a:r>
-            <a:r>
-              <a:rPr lang="en-GB" sz="2800" b="1" dirty="0"/>
-              <a:t>Conclusions</a:t>
-            </a:r>
-          </a:p>
-          <a:p>
-            <a:pPr lvl="1">
-              <a:buFont typeface="Arial" panose="020B0604020202020204" pitchFamily="34" charset="0"/>
-              <a:buChar char="•"/>
-            </a:pPr>
-            <a:r>
-              <a:rPr lang="en-GB" sz="2600" i="1" dirty="0"/>
-              <a:t>Primary Findings</a:t>
-            </a:r>
-          </a:p>
-          <a:p>
-            <a:pPr lvl="1">
-              <a:buFont typeface="Arial" panose="020B0604020202020204" pitchFamily="34" charset="0"/>
-              <a:buChar char="•"/>
-            </a:pPr>
-            <a:r>
-              <a:rPr lang="en-GB" sz="2600" i="1" dirty="0"/>
-              <a:t>Further Work</a:t>
-            </a:r>
-            <a:endParaRPr lang="en-GB" sz="2600" dirty="0"/>
+              <a:t> Conclusions</a:t>
+            </a:r>
           </a:p>
           <a:p>
             <a:endParaRPr lang="en-GB" dirty="0"/>
@@ -5802,7 +7148,7 @@
           <p:cNvPr id="7" name="Date Placeholder 6">
             <a:extLst>
               <a:ext uri="{FF2B5EF4-FFF2-40B4-BE49-F238E27FC236}">
-                <a16:creationId xmlns:a16="http://schemas.microsoft.com/office/drawing/2014/main" id="{A899C2D9-963B-4A7D-B350-213AC1754454}"/>
+                <a16:creationId xmlns:a16="http://schemas.microsoft.com/office/drawing/2014/main" id="{3C9CC48B-1CCE-412F-A1D4-0991F38FC073}"/>
               </a:ext>
             </a:extLst>
           </p:cNvPr>
@@ -5818,7 +7164,7 @@
           <a:bodyPr/>
           <a:lstStyle/>
           <a:p>
-            <a:fld id="{7F35EB2B-3FCE-4F7C-945F-B528C12B6B66}" type="datetime1">
+            <a:fld id="{339720CA-7F93-46E4-BD55-7C05EDF0D99C}" type="datetime1">
               <a:rPr lang="en-GB" smtClean="0"/>
               <a:t>06/05/2021</a:t>
             </a:fld>
@@ -5831,7 +7177,7 @@
           <p:cNvPr id="8" name="Footer Placeholder 7">
             <a:extLst>
               <a:ext uri="{FF2B5EF4-FFF2-40B4-BE49-F238E27FC236}">
-                <a16:creationId xmlns:a16="http://schemas.microsoft.com/office/drawing/2014/main" id="{5B41B150-3135-4FDE-9CE6-C3447A401A81}"/>
+                <a16:creationId xmlns:a16="http://schemas.microsoft.com/office/drawing/2014/main" id="{D4FFF9EB-6A54-4C2A-B9B2-AE903E9D1386}"/>
               </a:ext>
             </a:extLst>
           </p:cNvPr>
@@ -5859,7 +7205,7 @@
           <p:cNvPr id="9" name="Slide Number Placeholder 8">
             <a:extLst>
               <a:ext uri="{FF2B5EF4-FFF2-40B4-BE49-F238E27FC236}">
-                <a16:creationId xmlns:a16="http://schemas.microsoft.com/office/drawing/2014/main" id="{8CDB5539-7981-43FC-A4B3-45CFD7FCFCDE}"/>
+                <a16:creationId xmlns:a16="http://schemas.microsoft.com/office/drawing/2014/main" id="{B6C44EE6-121B-41BE-A574-497B1572AC93}"/>
               </a:ext>
             </a:extLst>
           </p:cNvPr>
@@ -5886,7 +7232,516 @@
     </p:spTree>
     <p:extLst>
       <p:ext uri="{BB962C8B-B14F-4D97-AF65-F5344CB8AC3E}">
-        <p14:creationId xmlns:p14="http://schemas.microsoft.com/office/powerpoint/2010/main" val="4282608364"/>
+        <p14:creationId xmlns:p14="http://schemas.microsoft.com/office/powerpoint/2010/main" val="1634486955"/>
+      </p:ext>
+    </p:extLst>
+  </p:cSld>
+  <p:clrMapOvr>
+    <a:masterClrMapping/>
+  </p:clrMapOvr>
+</p:sld>
+</file>
+
+<file path=ppt/slides/slide8.xml><?xml version="1.0" encoding="utf-8"?>
+<p:sld xmlns:a="http://schemas.openxmlformats.org/drawingml/2006/main" xmlns:r="http://schemas.openxmlformats.org/officeDocument/2006/relationships" xmlns:p="http://schemas.openxmlformats.org/presentationml/2006/main">
+  <p:cSld>
+    <p:spTree>
+      <p:nvGrpSpPr>
+        <p:cNvPr id="1" name=""/>
+        <p:cNvGrpSpPr/>
+        <p:nvPr/>
+      </p:nvGrpSpPr>
+      <p:grpSpPr>
+        <a:xfrm>
+          <a:off x="0" y="0"/>
+          <a:ext cx="0" cy="0"/>
+          <a:chOff x="0" y="0"/>
+          <a:chExt cx="0" cy="0"/>
+        </a:xfrm>
+      </p:grpSpPr>
+      <p:sp>
+        <p:nvSpPr>
+          <p:cNvPr id="2" name="Title 1">
+            <a:extLst>
+              <a:ext uri="{FF2B5EF4-FFF2-40B4-BE49-F238E27FC236}">
+                <a16:creationId xmlns:a16="http://schemas.microsoft.com/office/drawing/2014/main" id="{8942B4A0-F150-405A-9068-8F7612F09AE0}"/>
+              </a:ext>
+            </a:extLst>
+          </p:cNvPr>
+          <p:cNvSpPr>
+            <a:spLocks noGrp="1"/>
+          </p:cNvSpPr>
+          <p:nvPr>
+            <p:ph type="title"/>
+          </p:nvPr>
+        </p:nvSpPr>
+        <p:spPr/>
+        <p:txBody>
+          <a:bodyPr/>
+          <a:lstStyle/>
+          <a:p>
+            <a:r>
+              <a:rPr lang="en-GB" dirty="0"/>
+              <a:t>Rigid Rod Simulations</a:t>
+            </a:r>
+          </a:p>
+        </p:txBody>
+      </p:sp>
+      <p:sp>
+        <p:nvSpPr>
+          <p:cNvPr id="3" name="Content Placeholder 2">
+            <a:extLst>
+              <a:ext uri="{FF2B5EF4-FFF2-40B4-BE49-F238E27FC236}">
+                <a16:creationId xmlns:a16="http://schemas.microsoft.com/office/drawing/2014/main" id="{AC53D448-2676-4126-B047-DB0C6E8D4412}"/>
+              </a:ext>
+            </a:extLst>
+          </p:cNvPr>
+          <p:cNvSpPr>
+            <a:spLocks noGrp="1"/>
+          </p:cNvSpPr>
+          <p:nvPr>
+            <p:ph idx="1"/>
+          </p:nvPr>
+        </p:nvSpPr>
+        <p:spPr/>
+        <p:txBody>
+          <a:bodyPr>
+            <a:normAutofit/>
+          </a:bodyPr>
+          <a:lstStyle/>
+          <a:p>
+            <a:pPr>
+              <a:buFont typeface="Arial" panose="020B0604020202020204" pitchFamily="34" charset="0"/>
+              <a:buChar char="•"/>
+            </a:pPr>
+            <a:r>
+              <a:rPr lang="en-GB" sz="2800" dirty="0"/>
+              <a:t> Introduction</a:t>
+            </a:r>
+          </a:p>
+          <a:p>
+            <a:pPr>
+              <a:buFont typeface="Arial" panose="020B0604020202020204" pitchFamily="34" charset="0"/>
+              <a:buChar char="•"/>
+            </a:pPr>
+            <a:r>
+              <a:rPr lang="en-GB" sz="2800" b="1" dirty="0"/>
+              <a:t> </a:t>
+            </a:r>
+            <a:r>
+              <a:rPr lang="en-GB" sz="2800" dirty="0"/>
+              <a:t>Methods</a:t>
+            </a:r>
+          </a:p>
+          <a:p>
+            <a:pPr>
+              <a:buFont typeface="Arial" panose="020B0604020202020204" pitchFamily="34" charset="0"/>
+              <a:buChar char="•"/>
+            </a:pPr>
+            <a:r>
+              <a:rPr lang="en-GB" sz="2800" dirty="0"/>
+              <a:t> </a:t>
+            </a:r>
+            <a:r>
+              <a:rPr lang="en-GB" sz="2800" b="1" dirty="0"/>
+              <a:t>Rigid Rod Simulations</a:t>
+            </a:r>
+          </a:p>
+          <a:p>
+            <a:pPr lvl="1">
+              <a:buFont typeface="Arial" panose="020B0604020202020204" pitchFamily="34" charset="0"/>
+              <a:buChar char="•"/>
+            </a:pPr>
+            <a:r>
+              <a:rPr lang="en-GB" sz="2400" i="1" dirty="0"/>
+              <a:t>Nematic Transition</a:t>
+            </a:r>
+          </a:p>
+          <a:p>
+            <a:pPr lvl="1">
+              <a:buFont typeface="Arial" panose="020B0604020202020204" pitchFamily="34" charset="0"/>
+              <a:buChar char="•"/>
+            </a:pPr>
+            <a:r>
+              <a:rPr lang="en-GB" sz="2400" i="1" dirty="0"/>
+              <a:t>Smectic Transition</a:t>
+            </a:r>
+          </a:p>
+          <a:p>
+            <a:pPr>
+              <a:buFont typeface="Arial" panose="020B0604020202020204" pitchFamily="34" charset="0"/>
+              <a:buChar char="•"/>
+            </a:pPr>
+            <a:r>
+              <a:rPr lang="en-GB" sz="2800" dirty="0"/>
+              <a:t> Nunchuck Simulations </a:t>
+            </a:r>
+          </a:p>
+          <a:p>
+            <a:pPr>
+              <a:buFont typeface="Arial" panose="020B0604020202020204" pitchFamily="34" charset="0"/>
+              <a:buChar char="•"/>
+            </a:pPr>
+            <a:r>
+              <a:rPr lang="en-GB" sz="2800" dirty="0"/>
+              <a:t> Conclusions</a:t>
+            </a:r>
+          </a:p>
+          <a:p>
+            <a:endParaRPr lang="en-GB" dirty="0"/>
+          </a:p>
+        </p:txBody>
+      </p:sp>
+      <p:sp>
+        <p:nvSpPr>
+          <p:cNvPr id="7" name="Date Placeholder 6">
+            <a:extLst>
+              <a:ext uri="{FF2B5EF4-FFF2-40B4-BE49-F238E27FC236}">
+                <a16:creationId xmlns:a16="http://schemas.microsoft.com/office/drawing/2014/main" id="{C3EC29A1-3F1F-4672-BD61-9D8F6A796CD5}"/>
+              </a:ext>
+            </a:extLst>
+          </p:cNvPr>
+          <p:cNvSpPr>
+            <a:spLocks noGrp="1"/>
+          </p:cNvSpPr>
+          <p:nvPr>
+            <p:ph type="dt" sz="half" idx="10"/>
+          </p:nvPr>
+        </p:nvSpPr>
+        <p:spPr/>
+        <p:txBody>
+          <a:bodyPr/>
+          <a:lstStyle/>
+          <a:p>
+            <a:fld id="{5ED3C242-668A-4C09-B0F2-37AF4FC7BCE8}" type="datetime1">
+              <a:rPr lang="en-GB" smtClean="0"/>
+              <a:t>06/05/2021</a:t>
+            </a:fld>
+            <a:endParaRPr lang="en-GB"/>
+          </a:p>
+        </p:txBody>
+      </p:sp>
+      <p:sp>
+        <p:nvSpPr>
+          <p:cNvPr id="8" name="Footer Placeholder 7">
+            <a:extLst>
+              <a:ext uri="{FF2B5EF4-FFF2-40B4-BE49-F238E27FC236}">
+                <a16:creationId xmlns:a16="http://schemas.microsoft.com/office/drawing/2014/main" id="{53B70617-410A-4AB2-8AD5-DDE0CED9C1F5}"/>
+              </a:ext>
+            </a:extLst>
+          </p:cNvPr>
+          <p:cNvSpPr>
+            <a:spLocks noGrp="1"/>
+          </p:cNvSpPr>
+          <p:nvPr>
+            <p:ph type="ftr" sz="quarter" idx="11"/>
+          </p:nvPr>
+        </p:nvSpPr>
+        <p:spPr/>
+        <p:txBody>
+          <a:bodyPr/>
+          <a:lstStyle/>
+          <a:p>
+            <a:r>
+              <a:rPr lang="en-GB"/>
+              <a:t>Simulating Liqyuid Crystals</a:t>
+            </a:r>
+          </a:p>
+        </p:txBody>
+      </p:sp>
+      <p:sp>
+        <p:nvSpPr>
+          <p:cNvPr id="9" name="Slide Number Placeholder 8">
+            <a:extLst>
+              <a:ext uri="{FF2B5EF4-FFF2-40B4-BE49-F238E27FC236}">
+                <a16:creationId xmlns:a16="http://schemas.microsoft.com/office/drawing/2014/main" id="{837BB13C-55C4-4CAF-96F7-29F3B0A46D5D}"/>
+              </a:ext>
+            </a:extLst>
+          </p:cNvPr>
+          <p:cNvSpPr>
+            <a:spLocks noGrp="1"/>
+          </p:cNvSpPr>
+          <p:nvPr>
+            <p:ph type="sldNum" sz="quarter" idx="12"/>
+          </p:nvPr>
+        </p:nvSpPr>
+        <p:spPr/>
+        <p:txBody>
+          <a:bodyPr/>
+          <a:lstStyle/>
+          <a:p>
+            <a:fld id="{AB645ECC-7A7A-4729-8128-50B722794741}" type="slidenum">
+              <a:rPr lang="en-GB" smtClean="0"/>
+              <a:t>8</a:t>
+            </a:fld>
+            <a:endParaRPr lang="en-GB"/>
+          </a:p>
+        </p:txBody>
+      </p:sp>
+    </p:spTree>
+    <p:extLst>
+      <p:ext uri="{BB962C8B-B14F-4D97-AF65-F5344CB8AC3E}">
+        <p14:creationId xmlns:p14="http://schemas.microsoft.com/office/powerpoint/2010/main" val="2442228963"/>
+      </p:ext>
+    </p:extLst>
+  </p:cSld>
+  <p:clrMapOvr>
+    <a:masterClrMapping/>
+  </p:clrMapOvr>
+</p:sld>
+</file>
+
+<file path=ppt/slides/slide9.xml><?xml version="1.0" encoding="utf-8"?>
+<p:sld xmlns:a="http://schemas.openxmlformats.org/drawingml/2006/main" xmlns:r="http://schemas.openxmlformats.org/officeDocument/2006/relationships" xmlns:p="http://schemas.openxmlformats.org/presentationml/2006/main">
+  <p:cSld>
+    <p:spTree>
+      <p:nvGrpSpPr>
+        <p:cNvPr id="1" name=""/>
+        <p:cNvGrpSpPr/>
+        <p:nvPr/>
+      </p:nvGrpSpPr>
+      <p:grpSpPr>
+        <a:xfrm>
+          <a:off x="0" y="0"/>
+          <a:ext cx="0" cy="0"/>
+          <a:chOff x="0" y="0"/>
+          <a:chExt cx="0" cy="0"/>
+        </a:xfrm>
+      </p:grpSpPr>
+      <p:sp>
+        <p:nvSpPr>
+          <p:cNvPr id="2" name="Title 1">
+            <a:extLst>
+              <a:ext uri="{FF2B5EF4-FFF2-40B4-BE49-F238E27FC236}">
+                <a16:creationId xmlns:a16="http://schemas.microsoft.com/office/drawing/2014/main" id="{8942B4A0-F150-405A-9068-8F7612F09AE0}"/>
+              </a:ext>
+            </a:extLst>
+          </p:cNvPr>
+          <p:cNvSpPr>
+            <a:spLocks noGrp="1"/>
+          </p:cNvSpPr>
+          <p:nvPr>
+            <p:ph type="title"/>
+          </p:nvPr>
+        </p:nvSpPr>
+        <p:spPr/>
+        <p:txBody>
+          <a:bodyPr/>
+          <a:lstStyle/>
+          <a:p>
+            <a:r>
+              <a:rPr lang="en-GB" sz="4800" dirty="0"/>
+              <a:t>Nunchuck Simulations</a:t>
+            </a:r>
+            <a:endParaRPr lang="en-GB" dirty="0"/>
+          </a:p>
+        </p:txBody>
+      </p:sp>
+      <p:sp>
+        <p:nvSpPr>
+          <p:cNvPr id="3" name="Content Placeholder 2">
+            <a:extLst>
+              <a:ext uri="{FF2B5EF4-FFF2-40B4-BE49-F238E27FC236}">
+                <a16:creationId xmlns:a16="http://schemas.microsoft.com/office/drawing/2014/main" id="{AC53D448-2676-4126-B047-DB0C6E8D4412}"/>
+              </a:ext>
+            </a:extLst>
+          </p:cNvPr>
+          <p:cNvSpPr>
+            <a:spLocks noGrp="1"/>
+          </p:cNvSpPr>
+          <p:nvPr>
+            <p:ph idx="1"/>
+          </p:nvPr>
+        </p:nvSpPr>
+        <p:spPr/>
+        <p:txBody>
+          <a:bodyPr>
+            <a:normAutofit/>
+          </a:bodyPr>
+          <a:lstStyle/>
+          <a:p>
+            <a:pPr>
+              <a:buFont typeface="Arial" panose="020B0604020202020204" pitchFamily="34" charset="0"/>
+              <a:buChar char="•"/>
+            </a:pPr>
+            <a:r>
+              <a:rPr lang="en-GB" sz="2800" dirty="0"/>
+              <a:t> Introduction</a:t>
+            </a:r>
+          </a:p>
+          <a:p>
+            <a:pPr>
+              <a:buFont typeface="Arial" panose="020B0604020202020204" pitchFamily="34" charset="0"/>
+              <a:buChar char="•"/>
+            </a:pPr>
+            <a:r>
+              <a:rPr lang="en-GB" sz="2800" b="1" dirty="0"/>
+              <a:t> </a:t>
+            </a:r>
+            <a:r>
+              <a:rPr lang="en-GB" sz="2800" dirty="0"/>
+              <a:t>Methods</a:t>
+            </a:r>
+          </a:p>
+          <a:p>
+            <a:pPr>
+              <a:buFont typeface="Arial" panose="020B0604020202020204" pitchFamily="34" charset="0"/>
+              <a:buChar char="•"/>
+            </a:pPr>
+            <a:r>
+              <a:rPr lang="en-GB" sz="2800" dirty="0"/>
+              <a:t> Rigid Rod Simulations</a:t>
+            </a:r>
+          </a:p>
+          <a:p>
+            <a:pPr>
+              <a:buFont typeface="Arial" panose="020B0604020202020204" pitchFamily="34" charset="0"/>
+              <a:buChar char="•"/>
+            </a:pPr>
+            <a:r>
+              <a:rPr lang="en-GB" sz="2800" dirty="0"/>
+              <a:t> </a:t>
+            </a:r>
+            <a:r>
+              <a:rPr lang="en-GB" sz="2800" b="1" dirty="0"/>
+              <a:t>Nunchuck Simulations </a:t>
+            </a:r>
+          </a:p>
+          <a:p>
+            <a:pPr lvl="1">
+              <a:buFont typeface="Arial" panose="020B0604020202020204" pitchFamily="34" charset="0"/>
+              <a:buChar char="•"/>
+            </a:pPr>
+            <a:r>
+              <a:rPr lang="en-GB" sz="2400" i="1" dirty="0"/>
+              <a:t>Fixed Rigidity</a:t>
+            </a:r>
+          </a:p>
+          <a:p>
+            <a:pPr lvl="1">
+              <a:buFont typeface="Arial" panose="020B0604020202020204" pitchFamily="34" charset="0"/>
+              <a:buChar char="•"/>
+            </a:pPr>
+            <a:r>
+              <a:rPr lang="en-GB" sz="2400" i="1" dirty="0"/>
+              <a:t>Fixed Angle</a:t>
+            </a:r>
+          </a:p>
+          <a:p>
+            <a:pPr lvl="1">
+              <a:buFont typeface="Arial" panose="020B0604020202020204" pitchFamily="34" charset="0"/>
+              <a:buChar char="•"/>
+            </a:pPr>
+            <a:r>
+              <a:rPr lang="en-GB" sz="2400" i="1" dirty="0"/>
+              <a:t>Dynamic Properties</a:t>
+            </a:r>
+          </a:p>
+          <a:p>
+            <a:pPr>
+              <a:buFont typeface="Arial" panose="020B0604020202020204" pitchFamily="34" charset="0"/>
+              <a:buChar char="•"/>
+            </a:pPr>
+            <a:r>
+              <a:rPr lang="en-GB" sz="2800" dirty="0"/>
+              <a:t> Conclusions</a:t>
+            </a:r>
+          </a:p>
+          <a:p>
+            <a:endParaRPr lang="en-GB" dirty="0"/>
+          </a:p>
+        </p:txBody>
+      </p:sp>
+      <p:sp>
+        <p:nvSpPr>
+          <p:cNvPr id="7" name="Date Placeholder 6">
+            <a:extLst>
+              <a:ext uri="{FF2B5EF4-FFF2-40B4-BE49-F238E27FC236}">
+                <a16:creationId xmlns:a16="http://schemas.microsoft.com/office/drawing/2014/main" id="{F8D3FD9E-0468-4D84-B8AB-62CFA79681D8}"/>
+              </a:ext>
+            </a:extLst>
+          </p:cNvPr>
+          <p:cNvSpPr>
+            <a:spLocks noGrp="1"/>
+          </p:cNvSpPr>
+          <p:nvPr>
+            <p:ph type="dt" sz="half" idx="10"/>
+          </p:nvPr>
+        </p:nvSpPr>
+        <p:spPr/>
+        <p:txBody>
+          <a:bodyPr/>
+          <a:lstStyle/>
+          <a:p>
+            <a:fld id="{71A55007-BF49-4C86-8F7D-090310C8A7F3}" type="datetime1">
+              <a:rPr lang="en-GB" smtClean="0"/>
+              <a:t>06/05/2021</a:t>
+            </a:fld>
+            <a:endParaRPr lang="en-GB"/>
+          </a:p>
+        </p:txBody>
+      </p:sp>
+      <p:sp>
+        <p:nvSpPr>
+          <p:cNvPr id="8" name="Footer Placeholder 7">
+            <a:extLst>
+              <a:ext uri="{FF2B5EF4-FFF2-40B4-BE49-F238E27FC236}">
+                <a16:creationId xmlns:a16="http://schemas.microsoft.com/office/drawing/2014/main" id="{189657EC-EC9C-4C75-A24A-09DBF3570A54}"/>
+              </a:ext>
+            </a:extLst>
+          </p:cNvPr>
+          <p:cNvSpPr>
+            <a:spLocks noGrp="1"/>
+          </p:cNvSpPr>
+          <p:nvPr>
+            <p:ph type="ftr" sz="quarter" idx="11"/>
+          </p:nvPr>
+        </p:nvSpPr>
+        <p:spPr/>
+        <p:txBody>
+          <a:bodyPr/>
+          <a:lstStyle/>
+          <a:p>
+            <a:r>
+              <a:rPr lang="en-GB"/>
+              <a:t>Simulating Liqyuid Crystals</a:t>
+            </a:r>
+          </a:p>
+        </p:txBody>
+      </p:sp>
+      <p:sp>
+        <p:nvSpPr>
+          <p:cNvPr id="9" name="Slide Number Placeholder 8">
+            <a:extLst>
+              <a:ext uri="{FF2B5EF4-FFF2-40B4-BE49-F238E27FC236}">
+                <a16:creationId xmlns:a16="http://schemas.microsoft.com/office/drawing/2014/main" id="{8816638D-F0BD-468E-97B8-12C8EF9A6909}"/>
+              </a:ext>
+            </a:extLst>
+          </p:cNvPr>
+          <p:cNvSpPr>
+            <a:spLocks noGrp="1"/>
+          </p:cNvSpPr>
+          <p:nvPr>
+            <p:ph type="sldNum" sz="quarter" idx="12"/>
+          </p:nvPr>
+        </p:nvSpPr>
+        <p:spPr/>
+        <p:txBody>
+          <a:bodyPr/>
+          <a:lstStyle/>
+          <a:p>
+            <a:fld id="{AB645ECC-7A7A-4729-8128-50B722794741}" type="slidenum">
+              <a:rPr lang="en-GB" smtClean="0"/>
+              <a:t>9</a:t>
+            </a:fld>
+            <a:endParaRPr lang="en-GB"/>
+          </a:p>
+        </p:txBody>
+      </p:sp>
+    </p:spTree>
+    <p:extLst>
+      <p:ext uri="{BB962C8B-B14F-4D97-AF65-F5344CB8AC3E}">
+        <p14:creationId xmlns:p14="http://schemas.microsoft.com/office/powerpoint/2010/main" val="2301142952"/>
       </p:ext>
     </p:extLst>
   </p:cSld>

</xml_diff>

<commit_message>
rigid rods results presentation
</commit_message>
<xml_diff>
--- a/Report/Presentation/Simulating Liquid Crystals.pptx
+++ b/Report/Presentation/Simulating Liquid Crystals.pptx
@@ -7646,31 +7646,6 @@
       </p:sp>
       <p:sp>
         <p:nvSpPr>
-          <p:cNvPr id="3" name="Content Placeholder 2">
-            <a:extLst>
-              <a:ext uri="{FF2B5EF4-FFF2-40B4-BE49-F238E27FC236}">
-                <a16:creationId xmlns:a16="http://schemas.microsoft.com/office/drawing/2014/main" id="{41276C7F-8C58-40D2-B297-6516DCE9AE08}"/>
-              </a:ext>
-            </a:extLst>
-          </p:cNvPr>
-          <p:cNvSpPr>
-            <a:spLocks noGrp="1"/>
-          </p:cNvSpPr>
-          <p:nvPr>
-            <p:ph idx="1"/>
-          </p:nvPr>
-        </p:nvSpPr>
-        <p:spPr/>
-        <p:txBody>
-          <a:bodyPr/>
-          <a:lstStyle/>
-          <a:p>
-            <a:endParaRPr lang="en-GB"/>
-          </a:p>
-        </p:txBody>
-      </p:sp>
-      <p:sp>
-        <p:nvSpPr>
           <p:cNvPr id="4" name="Text Placeholder 3">
             <a:extLst>
               <a:ext uri="{FF2B5EF4-FFF2-40B4-BE49-F238E27FC236}">
@@ -7792,15 +7767,69 @@
             <p:ph type="body" sz="quarter" idx="13"/>
           </p:nvPr>
         </p:nvSpPr>
-        <p:spPr/>
-        <p:txBody>
-          <a:bodyPr/>
+        <p:spPr>
+          <a:xfrm>
+            <a:off x="4643021" y="5521325"/>
+            <a:ext cx="6968971" cy="693738"/>
+          </a:xfrm>
+        </p:spPr>
+        <p:txBody>
+          <a:bodyPr>
+            <a:noAutofit/>
+          </a:bodyPr>
           <a:lstStyle/>
           <a:p>
-            <a:endParaRPr lang="en-GB"/>
-          </a:p>
-        </p:txBody>
-      </p:sp>
+            <a:r>
+              <a:rPr lang="en-GB" i="1" dirty="0"/>
+              <a:t>Figure 5: The evolution of the volume fraction (φ) and the nematic order parameter (S</a:t>
+            </a:r>
+            <a:r>
+              <a:rPr lang="en-GB" i="1" baseline="-25000" dirty="0"/>
+              <a:t>n</a:t>
+            </a:r>
+            <a:r>
+              <a:rPr lang="en-GB" i="1" dirty="0"/>
+              <a:t>) over the timescale of the simulation.</a:t>
+            </a:r>
+          </a:p>
+        </p:txBody>
+      </p:sp>
+      <p:pic>
+        <p:nvPicPr>
+          <p:cNvPr id="16" name="Picture 15" descr="Chart, line chart, histogram&#10;&#10;Description automatically generated">
+            <a:extLst>
+              <a:ext uri="{FF2B5EF4-FFF2-40B4-BE49-F238E27FC236}">
+                <a16:creationId xmlns:a16="http://schemas.microsoft.com/office/drawing/2014/main" id="{F6D052F3-5C53-423F-8364-51523014E68D}"/>
+              </a:ext>
+            </a:extLst>
+          </p:cNvPr>
+          <p:cNvPicPr>
+            <a:picLocks noChangeAspect="1"/>
+          </p:cNvPicPr>
+          <p:nvPr/>
+        </p:nvPicPr>
+        <p:blipFill>
+          <a:blip r:embed="rId2">
+            <a:extLst>
+              <a:ext uri="{28A0092B-C50C-407E-A947-70E740481C1C}">
+                <a14:useLocalDpi xmlns:a14="http://schemas.microsoft.com/office/drawing/2010/main" val="0"/>
+              </a:ext>
+            </a:extLst>
+          </a:blip>
+          <a:stretch>
+            <a:fillRect/>
+          </a:stretch>
+        </p:blipFill>
+        <p:spPr>
+          <a:xfrm>
+            <a:off x="4711085" y="379254"/>
+            <a:ext cx="6662379" cy="5002210"/>
+          </a:xfrm>
+          <a:prstGeom prst="rect">
+            <a:avLst/>
+          </a:prstGeom>
+        </p:spPr>
+      </p:pic>
     </p:spTree>
     <p:extLst>
       <p:ext uri="{BB962C8B-B14F-4D97-AF65-F5344CB8AC3E}">
@@ -7861,31 +7890,6 @@
       </p:sp>
       <p:sp>
         <p:nvSpPr>
-          <p:cNvPr id="3" name="Content Placeholder 2">
-            <a:extLst>
-              <a:ext uri="{FF2B5EF4-FFF2-40B4-BE49-F238E27FC236}">
-                <a16:creationId xmlns:a16="http://schemas.microsoft.com/office/drawing/2014/main" id="{52ACB386-8AA8-4CE6-88F2-84DA8C7A1925}"/>
-              </a:ext>
-            </a:extLst>
-          </p:cNvPr>
-          <p:cNvSpPr>
-            <a:spLocks noGrp="1"/>
-          </p:cNvSpPr>
-          <p:nvPr>
-            <p:ph idx="1"/>
-          </p:nvPr>
-        </p:nvSpPr>
-        <p:spPr/>
-        <p:txBody>
-          <a:bodyPr/>
-          <a:lstStyle/>
-          <a:p>
-            <a:endParaRPr lang="en-GB"/>
-          </a:p>
-        </p:txBody>
-      </p:sp>
-      <p:sp>
-        <p:nvSpPr>
           <p:cNvPr id="4" name="Text Placeholder 3">
             <a:extLst>
               <a:ext uri="{FF2B5EF4-FFF2-40B4-BE49-F238E27FC236}">
@@ -8007,15 +8011,77 @@
             <p:ph type="body" sz="quarter" idx="13"/>
           </p:nvPr>
         </p:nvSpPr>
-        <p:spPr/>
-        <p:txBody>
-          <a:bodyPr/>
+        <p:spPr>
+          <a:xfrm>
+            <a:off x="4889377" y="5304797"/>
+            <a:ext cx="6483350" cy="693738"/>
+          </a:xfrm>
+        </p:spPr>
+        <p:txBody>
+          <a:bodyPr>
+            <a:noAutofit/>
+          </a:bodyPr>
           <a:lstStyle/>
           <a:p>
-            <a:endParaRPr lang="en-GB"/>
-          </a:p>
-        </p:txBody>
-      </p:sp>
+            <a:r>
+              <a:rPr lang="en-GB" i="1" dirty="0"/>
+              <a:t>Figure 6: The evolution of the volume fraction (φ) against both the nematic (S</a:t>
+            </a:r>
+            <a:r>
+              <a:rPr lang="en-GB" i="1" baseline="-25000" dirty="0"/>
+              <a:t>n</a:t>
+            </a:r>
+            <a:r>
+              <a:rPr lang="en-GB" i="1" dirty="0"/>
+              <a:t>) and smectic (S</a:t>
+            </a:r>
+            <a:r>
+              <a:rPr lang="en-GB" i="1" baseline="-25000" dirty="0"/>
+              <a:t>s</a:t>
+            </a:r>
+            <a:r>
+              <a:rPr lang="en-GB" i="1" dirty="0"/>
+              <a:t>) order parameters over the timescale of the simulation</a:t>
+            </a:r>
+          </a:p>
+        </p:txBody>
+      </p:sp>
+      <p:pic>
+        <p:nvPicPr>
+          <p:cNvPr id="10" name="Picture 9" descr="Chart&#10;&#10;Description automatically generated">
+            <a:extLst>
+              <a:ext uri="{FF2B5EF4-FFF2-40B4-BE49-F238E27FC236}">
+                <a16:creationId xmlns:a16="http://schemas.microsoft.com/office/drawing/2014/main" id="{98B3C535-2534-4A7B-A970-28A0467BCD15}"/>
+              </a:ext>
+            </a:extLst>
+          </p:cNvPr>
+          <p:cNvPicPr>
+            <a:picLocks noChangeAspect="1"/>
+          </p:cNvPicPr>
+          <p:nvPr/>
+        </p:nvPicPr>
+        <p:blipFill>
+          <a:blip r:embed="rId2">
+            <a:extLst>
+              <a:ext uri="{28A0092B-C50C-407E-A947-70E740481C1C}">
+                <a14:useLocalDpi xmlns:a14="http://schemas.microsoft.com/office/drawing/2010/main" val="0"/>
+              </a:ext>
+            </a:extLst>
+          </a:blip>
+          <a:stretch>
+            <a:fillRect/>
+          </a:stretch>
+        </p:blipFill>
+        <p:spPr>
+          <a:xfrm>
+            <a:off x="4800600" y="345415"/>
+            <a:ext cx="6483350" cy="4867792"/>
+          </a:xfrm>
+          <a:prstGeom prst="rect">
+            <a:avLst/>
+          </a:prstGeom>
+        </p:spPr>
+      </p:pic>
     </p:spTree>
     <p:extLst>
       <p:ext uri="{BB962C8B-B14F-4D97-AF65-F5344CB8AC3E}">
@@ -11413,8 +11479,8 @@
           </a:p>
         </p:txBody>
       </p:sp>
-      <mc:AlternateContent xmlns:mc="http://schemas.openxmlformats.org/markup-compatibility/2006">
-        <mc:Choice xmlns:a14="http://schemas.microsoft.com/office/drawing/2010/main" Requires="a14">
+      <mc:AlternateContent xmlns:mc="http://schemas.openxmlformats.org/markup-compatibility/2006" xmlns:a14="http://schemas.microsoft.com/office/drawing/2010/main">
+        <mc:Choice Requires="a14">
           <p:sp>
             <p:nvSpPr>
               <p:cNvPr id="3" name="Content Placeholder 2">
@@ -11827,7 +11893,7 @@
             </p:txBody>
           </p:sp>
         </mc:Choice>
-        <mc:Fallback>
+        <mc:Fallback xmlns="">
           <p:sp>
             <p:nvSpPr>
               <p:cNvPr id="3" name="Content Placeholder 2">

</xml_diff>